<commit_message>
threshold the number of sequences for evaluation when computing average across locs and nowcastdates
</commit_message>
<xml_diff>
--- a/output/figs/schematic_figs/schematic_fig_clade_assignment_2.pptx
+++ b/output/figs/schematic_figs/schematic_fig_clade_assignment_2.pptx
@@ -4,6 +4,9 @@
   <p:sldMasterIdLst>
     <p:sldMasterId id="2147483648" r:id="rId1"/>
   </p:sldMasterIdLst>
+  <p:notesMasterIdLst>
+    <p:notesMasterId r:id="rId3"/>
+  </p:notesMasterIdLst>
   <p:sldIdLst>
     <p:sldId id="256" r:id="rId2"/>
   </p:sldIdLst>
@@ -104,7 +107,449 @@
       </a:defRPr>
     </a:lvl9pPr>
   </p:defaultTextStyle>
+  <p:extLst>
+    <p:ext uri="{EFAFB233-063F-42B5-8137-9DF3F51BA10A}">
+      <p15:sldGuideLst xmlns:p15="http://schemas.microsoft.com/office/powerpoint/2012/main"/>
+    </p:ext>
+  </p:extLst>
 </p:presentation>
+</file>
+
+<file path=ppt/notesMasters/notesMaster1.xml><?xml version="1.0" encoding="utf-8"?>
+<p:notesMaster xmlns:a="http://schemas.openxmlformats.org/drawingml/2006/main" xmlns:r="http://schemas.openxmlformats.org/officeDocument/2006/relationships" xmlns:p="http://schemas.openxmlformats.org/presentationml/2006/main">
+  <p:cSld>
+    <p:bg>
+      <p:bgRef idx="1001">
+        <a:schemeClr val="bg1"/>
+      </p:bgRef>
+    </p:bg>
+    <p:spTree>
+      <p:nvGrpSpPr>
+        <p:cNvPr id="1" name=""/>
+        <p:cNvGrpSpPr/>
+        <p:nvPr/>
+      </p:nvGrpSpPr>
+      <p:grpSpPr>
+        <a:xfrm>
+          <a:off x="0" y="0"/>
+          <a:ext cx="0" cy="0"/>
+          <a:chOff x="0" y="0"/>
+          <a:chExt cx="0" cy="0"/>
+        </a:xfrm>
+      </p:grpSpPr>
+      <p:sp>
+        <p:nvSpPr>
+          <p:cNvPr id="2" name="Header Placeholder 1"/>
+          <p:cNvSpPr>
+            <a:spLocks noGrp="1"/>
+          </p:cNvSpPr>
+          <p:nvPr>
+            <p:ph type="hdr" sz="quarter"/>
+          </p:nvPr>
+        </p:nvSpPr>
+        <p:spPr>
+          <a:xfrm>
+            <a:off x="0" y="0"/>
+            <a:ext cx="2971800" cy="458788"/>
+          </a:xfrm>
+          <a:prstGeom prst="rect">
+            <a:avLst/>
+          </a:prstGeom>
+        </p:spPr>
+        <p:txBody>
+          <a:bodyPr vert="horz" lIns="91440" tIns="45720" rIns="91440" bIns="45720" rtlCol="0"/>
+          <a:lstStyle>
+            <a:lvl1pPr algn="l">
+              <a:defRPr sz="1200"/>
+            </a:lvl1pPr>
+          </a:lstStyle>
+          <a:p>
+            <a:endParaRPr lang="en-US"/>
+          </a:p>
+        </p:txBody>
+      </p:sp>
+      <p:sp>
+        <p:nvSpPr>
+          <p:cNvPr id="3" name="Date Placeholder 2"/>
+          <p:cNvSpPr>
+            <a:spLocks noGrp="1"/>
+          </p:cNvSpPr>
+          <p:nvPr>
+            <p:ph type="dt" idx="1"/>
+          </p:nvPr>
+        </p:nvSpPr>
+        <p:spPr>
+          <a:xfrm>
+            <a:off x="3884613" y="0"/>
+            <a:ext cx="2971800" cy="458788"/>
+          </a:xfrm>
+          <a:prstGeom prst="rect">
+            <a:avLst/>
+          </a:prstGeom>
+        </p:spPr>
+        <p:txBody>
+          <a:bodyPr vert="horz" lIns="91440" tIns="45720" rIns="91440" bIns="45720" rtlCol="0"/>
+          <a:lstStyle>
+            <a:lvl1pPr algn="r">
+              <a:defRPr sz="1200"/>
+            </a:lvl1pPr>
+          </a:lstStyle>
+          <a:p>
+            <a:fld id="{5D90DDDA-0390-7747-9092-B03DF40F8BE2}" type="datetimeFigureOut">
+              <a:rPr lang="en-US" smtClean="0"/>
+              <a:t>2/17/26</a:t>
+            </a:fld>
+            <a:endParaRPr lang="en-US"/>
+          </a:p>
+        </p:txBody>
+      </p:sp>
+      <p:sp>
+        <p:nvSpPr>
+          <p:cNvPr id="4" name="Slide Image Placeholder 3"/>
+          <p:cNvSpPr>
+            <a:spLocks noGrp="1" noRot="1" noChangeAspect="1"/>
+          </p:cNvSpPr>
+          <p:nvPr>
+            <p:ph type="sldImg" idx="2"/>
+          </p:nvPr>
+        </p:nvSpPr>
+        <p:spPr>
+          <a:xfrm>
+            <a:off x="685800" y="1143000"/>
+            <a:ext cx="5486400" cy="3086100"/>
+          </a:xfrm>
+          <a:prstGeom prst="rect">
+            <a:avLst/>
+          </a:prstGeom>
+          <a:noFill/>
+          <a:ln w="12700">
+            <a:solidFill>
+              <a:prstClr val="black"/>
+            </a:solidFill>
+          </a:ln>
+        </p:spPr>
+        <p:txBody>
+          <a:bodyPr vert="horz" lIns="91440" tIns="45720" rIns="91440" bIns="45720" rtlCol="0" anchor="ctr"/>
+          <a:lstStyle/>
+          <a:p>
+            <a:endParaRPr lang="en-US"/>
+          </a:p>
+        </p:txBody>
+      </p:sp>
+      <p:sp>
+        <p:nvSpPr>
+          <p:cNvPr id="5" name="Notes Placeholder 4"/>
+          <p:cNvSpPr>
+            <a:spLocks noGrp="1"/>
+          </p:cNvSpPr>
+          <p:nvPr>
+            <p:ph type="body" sz="quarter" idx="3"/>
+          </p:nvPr>
+        </p:nvSpPr>
+        <p:spPr>
+          <a:xfrm>
+            <a:off x="685800" y="4400550"/>
+            <a:ext cx="5486400" cy="3600450"/>
+          </a:xfrm>
+          <a:prstGeom prst="rect">
+            <a:avLst/>
+          </a:prstGeom>
+        </p:spPr>
+        <p:txBody>
+          <a:bodyPr vert="horz" lIns="91440" tIns="45720" rIns="91440" bIns="45720" rtlCol="0"/>
+          <a:lstStyle/>
+          <a:p>
+            <a:pPr lvl="0"/>
+            <a:r>
+              <a:rPr lang="en-GB"/>
+              <a:t>Click to edit Master text styles</a:t>
+            </a:r>
+          </a:p>
+          <a:p>
+            <a:pPr lvl="1"/>
+            <a:r>
+              <a:rPr lang="en-GB"/>
+              <a:t>Second level</a:t>
+            </a:r>
+          </a:p>
+          <a:p>
+            <a:pPr lvl="2"/>
+            <a:r>
+              <a:rPr lang="en-GB"/>
+              <a:t>Third level</a:t>
+            </a:r>
+          </a:p>
+          <a:p>
+            <a:pPr lvl="3"/>
+            <a:r>
+              <a:rPr lang="en-GB"/>
+              <a:t>Fourth level</a:t>
+            </a:r>
+          </a:p>
+          <a:p>
+            <a:pPr lvl="4"/>
+            <a:r>
+              <a:rPr lang="en-GB"/>
+              <a:t>Fifth level</a:t>
+            </a:r>
+            <a:endParaRPr lang="en-US"/>
+          </a:p>
+        </p:txBody>
+      </p:sp>
+      <p:sp>
+        <p:nvSpPr>
+          <p:cNvPr id="6" name="Footer Placeholder 5"/>
+          <p:cNvSpPr>
+            <a:spLocks noGrp="1"/>
+          </p:cNvSpPr>
+          <p:nvPr>
+            <p:ph type="ftr" sz="quarter" idx="4"/>
+          </p:nvPr>
+        </p:nvSpPr>
+        <p:spPr>
+          <a:xfrm>
+            <a:off x="0" y="8685213"/>
+            <a:ext cx="2971800" cy="458787"/>
+          </a:xfrm>
+          <a:prstGeom prst="rect">
+            <a:avLst/>
+          </a:prstGeom>
+        </p:spPr>
+        <p:txBody>
+          <a:bodyPr vert="horz" lIns="91440" tIns="45720" rIns="91440" bIns="45720" rtlCol="0" anchor="b"/>
+          <a:lstStyle>
+            <a:lvl1pPr algn="l">
+              <a:defRPr sz="1200"/>
+            </a:lvl1pPr>
+          </a:lstStyle>
+          <a:p>
+            <a:endParaRPr lang="en-US"/>
+          </a:p>
+        </p:txBody>
+      </p:sp>
+      <p:sp>
+        <p:nvSpPr>
+          <p:cNvPr id="7" name="Slide Number Placeholder 6"/>
+          <p:cNvSpPr>
+            <a:spLocks noGrp="1"/>
+          </p:cNvSpPr>
+          <p:nvPr>
+            <p:ph type="sldNum" sz="quarter" idx="5"/>
+          </p:nvPr>
+        </p:nvSpPr>
+        <p:spPr>
+          <a:xfrm>
+            <a:off x="3884613" y="8685213"/>
+            <a:ext cx="2971800" cy="458787"/>
+          </a:xfrm>
+          <a:prstGeom prst="rect">
+            <a:avLst/>
+          </a:prstGeom>
+        </p:spPr>
+        <p:txBody>
+          <a:bodyPr vert="horz" lIns="91440" tIns="45720" rIns="91440" bIns="45720" rtlCol="0" anchor="b"/>
+          <a:lstStyle>
+            <a:lvl1pPr algn="r">
+              <a:defRPr sz="1200"/>
+            </a:lvl1pPr>
+          </a:lstStyle>
+          <a:p>
+            <a:fld id="{B1B2E058-E5EB-6F43-9ECB-7707C8516128}" type="slidenum">
+              <a:rPr lang="en-US" smtClean="0"/>
+              <a:t>‹#›</a:t>
+            </a:fld>
+            <a:endParaRPr lang="en-US"/>
+          </a:p>
+        </p:txBody>
+      </p:sp>
+    </p:spTree>
+    <p:extLst>
+      <p:ext uri="{BB962C8B-B14F-4D97-AF65-F5344CB8AC3E}">
+        <p14:creationId xmlns:p14="http://schemas.microsoft.com/office/powerpoint/2010/main" val="3335648198"/>
+      </p:ext>
+    </p:extLst>
+  </p:cSld>
+  <p:clrMap bg1="lt1" tx1="dk1" bg2="lt2" tx2="dk2" accent1="accent1" accent2="accent2" accent3="accent3" accent4="accent4" accent5="accent5" accent6="accent6" hlink="hlink" folHlink="folHlink"/>
+  <p:notesStyle>
+    <a:lvl1pPr marL="0" algn="l" defTabSz="914400" rtl="0" eaLnBrk="1" latinLnBrk="0" hangingPunct="1">
+      <a:defRPr sz="1200" kern="1200">
+        <a:solidFill>
+          <a:schemeClr val="tx1"/>
+        </a:solidFill>
+        <a:latin typeface="+mn-lt"/>
+        <a:ea typeface="+mn-ea"/>
+        <a:cs typeface="+mn-cs"/>
+      </a:defRPr>
+    </a:lvl1pPr>
+    <a:lvl2pPr marL="457200" algn="l" defTabSz="914400" rtl="0" eaLnBrk="1" latinLnBrk="0" hangingPunct="1">
+      <a:defRPr sz="1200" kern="1200">
+        <a:solidFill>
+          <a:schemeClr val="tx1"/>
+        </a:solidFill>
+        <a:latin typeface="+mn-lt"/>
+        <a:ea typeface="+mn-ea"/>
+        <a:cs typeface="+mn-cs"/>
+      </a:defRPr>
+    </a:lvl2pPr>
+    <a:lvl3pPr marL="914400" algn="l" defTabSz="914400" rtl="0" eaLnBrk="1" latinLnBrk="0" hangingPunct="1">
+      <a:defRPr sz="1200" kern="1200">
+        <a:solidFill>
+          <a:schemeClr val="tx1"/>
+        </a:solidFill>
+        <a:latin typeface="+mn-lt"/>
+        <a:ea typeface="+mn-ea"/>
+        <a:cs typeface="+mn-cs"/>
+      </a:defRPr>
+    </a:lvl3pPr>
+    <a:lvl4pPr marL="1371600" algn="l" defTabSz="914400" rtl="0" eaLnBrk="1" latinLnBrk="0" hangingPunct="1">
+      <a:defRPr sz="1200" kern="1200">
+        <a:solidFill>
+          <a:schemeClr val="tx1"/>
+        </a:solidFill>
+        <a:latin typeface="+mn-lt"/>
+        <a:ea typeface="+mn-ea"/>
+        <a:cs typeface="+mn-cs"/>
+      </a:defRPr>
+    </a:lvl4pPr>
+    <a:lvl5pPr marL="1828800" algn="l" defTabSz="914400" rtl="0" eaLnBrk="1" latinLnBrk="0" hangingPunct="1">
+      <a:defRPr sz="1200" kern="1200">
+        <a:solidFill>
+          <a:schemeClr val="tx1"/>
+        </a:solidFill>
+        <a:latin typeface="+mn-lt"/>
+        <a:ea typeface="+mn-ea"/>
+        <a:cs typeface="+mn-cs"/>
+      </a:defRPr>
+    </a:lvl5pPr>
+    <a:lvl6pPr marL="2286000" algn="l" defTabSz="914400" rtl="0" eaLnBrk="1" latinLnBrk="0" hangingPunct="1">
+      <a:defRPr sz="1200" kern="1200">
+        <a:solidFill>
+          <a:schemeClr val="tx1"/>
+        </a:solidFill>
+        <a:latin typeface="+mn-lt"/>
+        <a:ea typeface="+mn-ea"/>
+        <a:cs typeface="+mn-cs"/>
+      </a:defRPr>
+    </a:lvl6pPr>
+    <a:lvl7pPr marL="2743200" algn="l" defTabSz="914400" rtl="0" eaLnBrk="1" latinLnBrk="0" hangingPunct="1">
+      <a:defRPr sz="1200" kern="1200">
+        <a:solidFill>
+          <a:schemeClr val="tx1"/>
+        </a:solidFill>
+        <a:latin typeface="+mn-lt"/>
+        <a:ea typeface="+mn-ea"/>
+        <a:cs typeface="+mn-cs"/>
+      </a:defRPr>
+    </a:lvl7pPr>
+    <a:lvl8pPr marL="3200400" algn="l" defTabSz="914400" rtl="0" eaLnBrk="1" latinLnBrk="0" hangingPunct="1">
+      <a:defRPr sz="1200" kern="1200">
+        <a:solidFill>
+          <a:schemeClr val="tx1"/>
+        </a:solidFill>
+        <a:latin typeface="+mn-lt"/>
+        <a:ea typeface="+mn-ea"/>
+        <a:cs typeface="+mn-cs"/>
+      </a:defRPr>
+    </a:lvl8pPr>
+    <a:lvl9pPr marL="3657600" algn="l" defTabSz="914400" rtl="0" eaLnBrk="1" latinLnBrk="0" hangingPunct="1">
+      <a:defRPr sz="1200" kern="1200">
+        <a:solidFill>
+          <a:schemeClr val="tx1"/>
+        </a:solidFill>
+        <a:latin typeface="+mn-lt"/>
+        <a:ea typeface="+mn-ea"/>
+        <a:cs typeface="+mn-cs"/>
+      </a:defRPr>
+    </a:lvl9pPr>
+  </p:notesStyle>
+</p:notesMaster>
+</file>
+
+<file path=ppt/notesSlides/notesSlide1.xml><?xml version="1.0" encoding="utf-8"?>
+<p:notes xmlns:a="http://schemas.openxmlformats.org/drawingml/2006/main" xmlns:r="http://schemas.openxmlformats.org/officeDocument/2006/relationships" xmlns:p="http://schemas.openxmlformats.org/presentationml/2006/main">
+  <p:cSld>
+    <p:spTree>
+      <p:nvGrpSpPr>
+        <p:cNvPr id="1" name=""/>
+        <p:cNvGrpSpPr/>
+        <p:nvPr/>
+      </p:nvGrpSpPr>
+      <p:grpSpPr>
+        <a:xfrm>
+          <a:off x="0" y="0"/>
+          <a:ext cx="0" cy="0"/>
+          <a:chOff x="0" y="0"/>
+          <a:chExt cx="0" cy="0"/>
+        </a:xfrm>
+      </p:grpSpPr>
+      <p:sp>
+        <p:nvSpPr>
+          <p:cNvPr id="2" name="Slide Image Placeholder 1"/>
+          <p:cNvSpPr>
+            <a:spLocks noGrp="1" noRot="1" noChangeAspect="1"/>
+          </p:cNvSpPr>
+          <p:nvPr>
+            <p:ph type="sldImg"/>
+          </p:nvPr>
+        </p:nvSpPr>
+        <p:spPr/>
+      </p:sp>
+      <p:sp>
+        <p:nvSpPr>
+          <p:cNvPr id="3" name="Notes Placeholder 2"/>
+          <p:cNvSpPr>
+            <a:spLocks noGrp="1"/>
+          </p:cNvSpPr>
+          <p:nvPr>
+            <p:ph type="body" idx="1"/>
+          </p:nvPr>
+        </p:nvSpPr>
+        <p:spPr/>
+        <p:txBody>
+          <a:bodyPr/>
+          <a:lstStyle/>
+          <a:p>
+            <a:r>
+              <a:rPr lang="en-US" dirty="0"/>
+              <a:t>Illustration of clade assignment using different combinations of dates when sequences are available and versions of the reference tree. Two dates are relevant: the nowcast date, tau_1, and the evaluation date, tau_2. (A). Clade assignment of sequences reported as of the nowcast date using the reference tree available as of the nowcast date; used for model estimation. (B). Clade assignment of sequences reported as of the evaluation date using the reference tree available as of the evaluation date; not used. (C). Clade assignment of sequences reported as of the evaluation date using the reference tree available as of the nowcast date; used for nowcast evaluation. Clade assignments using different reference trees are not comparable, so the same reference tree is used when creating data for model fitting and for evaluation.</a:t>
+            </a:r>
+          </a:p>
+        </p:txBody>
+      </p:sp>
+      <p:sp>
+        <p:nvSpPr>
+          <p:cNvPr id="4" name="Slide Number Placeholder 3"/>
+          <p:cNvSpPr>
+            <a:spLocks noGrp="1"/>
+          </p:cNvSpPr>
+          <p:nvPr>
+            <p:ph type="sldNum" sz="quarter" idx="5"/>
+          </p:nvPr>
+        </p:nvSpPr>
+        <p:spPr/>
+        <p:txBody>
+          <a:bodyPr/>
+          <a:lstStyle/>
+          <a:p>
+            <a:fld id="{B1B2E058-E5EB-6F43-9ECB-7707C8516128}" type="slidenum">
+              <a:rPr lang="en-US" smtClean="0"/>
+              <a:t>1</a:t>
+            </a:fld>
+            <a:endParaRPr lang="en-US"/>
+          </a:p>
+        </p:txBody>
+      </p:sp>
+    </p:spTree>
+    <p:extLst>
+      <p:ext uri="{BB962C8B-B14F-4D97-AF65-F5344CB8AC3E}">
+        <p14:creationId xmlns:p14="http://schemas.microsoft.com/office/powerpoint/2010/main" val="1368616473"/>
+      </p:ext>
+    </p:extLst>
+  </p:cSld>
+  <p:clrMapOvr>
+    <a:masterClrMapping/>
+  </p:clrMapOvr>
+</p:notes>
 </file>
 
 <file path=ppt/slideLayouts/slideLayout1.xml><?xml version="1.0" encoding="utf-8"?>
@@ -256,7 +701,7 @@
           <a:p>
             <a:fld id="{13F85839-247B-534A-BD25-CCD76748D5B6}" type="datetimeFigureOut">
               <a:rPr lang="en-US" smtClean="0"/>
-              <a:t>1/9/26</a:t>
+              <a:t>2/17/26</a:t>
             </a:fld>
             <a:endParaRPr lang="en-US"/>
           </a:p>
@@ -456,7 +901,7 @@
           <a:p>
             <a:fld id="{13F85839-247B-534A-BD25-CCD76748D5B6}" type="datetimeFigureOut">
               <a:rPr lang="en-US" smtClean="0"/>
-              <a:t>1/9/26</a:t>
+              <a:t>2/17/26</a:t>
             </a:fld>
             <a:endParaRPr lang="en-US"/>
           </a:p>
@@ -666,7 +1111,7 @@
           <a:p>
             <a:fld id="{13F85839-247B-534A-BD25-CCD76748D5B6}" type="datetimeFigureOut">
               <a:rPr lang="en-US" smtClean="0"/>
-              <a:t>1/9/26</a:t>
+              <a:t>2/17/26</a:t>
             </a:fld>
             <a:endParaRPr lang="en-US"/>
           </a:p>
@@ -866,7 +1311,7 @@
           <a:p>
             <a:fld id="{13F85839-247B-534A-BD25-CCD76748D5B6}" type="datetimeFigureOut">
               <a:rPr lang="en-US" smtClean="0"/>
-              <a:t>1/9/26</a:t>
+              <a:t>2/17/26</a:t>
             </a:fld>
             <a:endParaRPr lang="en-US"/>
           </a:p>
@@ -1142,7 +1587,7 @@
           <a:p>
             <a:fld id="{13F85839-247B-534A-BD25-CCD76748D5B6}" type="datetimeFigureOut">
               <a:rPr lang="en-US" smtClean="0"/>
-              <a:t>1/9/26</a:t>
+              <a:t>2/17/26</a:t>
             </a:fld>
             <a:endParaRPr lang="en-US"/>
           </a:p>
@@ -1410,7 +1855,7 @@
           <a:p>
             <a:fld id="{13F85839-247B-534A-BD25-CCD76748D5B6}" type="datetimeFigureOut">
               <a:rPr lang="en-US" smtClean="0"/>
-              <a:t>1/9/26</a:t>
+              <a:t>2/17/26</a:t>
             </a:fld>
             <a:endParaRPr lang="en-US"/>
           </a:p>
@@ -1825,7 +2270,7 @@
           <a:p>
             <a:fld id="{13F85839-247B-534A-BD25-CCD76748D5B6}" type="datetimeFigureOut">
               <a:rPr lang="en-US" smtClean="0"/>
-              <a:t>1/9/26</a:t>
+              <a:t>2/17/26</a:t>
             </a:fld>
             <a:endParaRPr lang="en-US"/>
           </a:p>
@@ -1967,7 +2412,7 @@
           <a:p>
             <a:fld id="{13F85839-247B-534A-BD25-CCD76748D5B6}" type="datetimeFigureOut">
               <a:rPr lang="en-US" smtClean="0"/>
-              <a:t>1/9/26</a:t>
+              <a:t>2/17/26</a:t>
             </a:fld>
             <a:endParaRPr lang="en-US"/>
           </a:p>
@@ -2080,7 +2525,7 @@
           <a:p>
             <a:fld id="{13F85839-247B-534A-BD25-CCD76748D5B6}" type="datetimeFigureOut">
               <a:rPr lang="en-US" smtClean="0"/>
-              <a:t>1/9/26</a:t>
+              <a:t>2/17/26</a:t>
             </a:fld>
             <a:endParaRPr lang="en-US"/>
           </a:p>
@@ -2393,7 +2838,7 @@
           <a:p>
             <a:fld id="{13F85839-247B-534A-BD25-CCD76748D5B6}" type="datetimeFigureOut">
               <a:rPr lang="en-US" smtClean="0"/>
-              <a:t>1/9/26</a:t>
+              <a:t>2/17/26</a:t>
             </a:fld>
             <a:endParaRPr lang="en-US"/>
           </a:p>
@@ -2682,7 +3127,7 @@
           <a:p>
             <a:fld id="{13F85839-247B-534A-BD25-CCD76748D5B6}" type="datetimeFigureOut">
               <a:rPr lang="en-US" smtClean="0"/>
-              <a:t>1/9/26</a:t>
+              <a:t>2/17/26</a:t>
             </a:fld>
             <a:endParaRPr lang="en-US"/>
           </a:p>
@@ -2925,7 +3370,7 @@
           <a:p>
             <a:fld id="{13F85839-247B-534A-BD25-CCD76748D5B6}" type="datetimeFigureOut">
               <a:rPr lang="en-US" smtClean="0"/>
-              <a:t>1/9/26</a:t>
+              <a:t>2/17/26</a:t>
             </a:fld>
             <a:endParaRPr lang="en-US"/>
           </a:p>
@@ -3399,7 +3844,7 @@
         </p:nvSpPr>
         <p:spPr>
           <a:xfrm rot="16200000">
-            <a:off x="26262" y="2268013"/>
+            <a:off x="122536" y="2586656"/>
             <a:ext cx="677616" cy="369332"/>
           </a:xfrm>
           <a:prstGeom prst="rect">
@@ -3430,10 +3875,10 @@
       </p:sp>
       <p:sp>
         <p:nvSpPr>
-          <p:cNvPr id="6" name="TextBox 5">
-            <a:extLst>
-              <a:ext uri="{FF2B5EF4-FFF2-40B4-BE49-F238E27FC236}">
-                <a16:creationId xmlns:a16="http://schemas.microsoft.com/office/drawing/2014/main" id="{17FB92AC-139F-6D77-F7F9-5072A6DB811D}"/>
+          <p:cNvPr id="7" name="TextBox 6">
+            <a:extLst>
+              <a:ext uri="{FF2B5EF4-FFF2-40B4-BE49-F238E27FC236}">
+                <a16:creationId xmlns:a16="http://schemas.microsoft.com/office/drawing/2014/main" id="{651284EE-5B0E-BB8A-2CD7-6BF22E5F2C35}"/>
               </a:ext>
             </a:extLst>
           </p:cNvPr>
@@ -3442,8 +3887,8 @@
         </p:nvSpPr>
         <p:spPr>
           <a:xfrm>
-            <a:off x="147001" y="3817037"/>
-            <a:ext cx="5521862" cy="369332"/>
+            <a:off x="433837" y="10312"/>
+            <a:ext cx="2057400" cy="276999"/>
           </a:xfrm>
           <a:prstGeom prst="rect">
             <a:avLst/>
@@ -3457,18 +3902,18 @@
           <a:lstStyle/>
           <a:p>
             <a:r>
-              <a:rPr lang="en-US" dirty="0"/>
-              <a:t>Retrospective clade assignment for evaluation </a:t>
-            </a:r>
-          </a:p>
-        </p:txBody>
-      </p:sp>
-      <p:sp>
-        <p:nvSpPr>
-          <p:cNvPr id="7" name="TextBox 6">
-            <a:extLst>
-              <a:ext uri="{FF2B5EF4-FFF2-40B4-BE49-F238E27FC236}">
-                <a16:creationId xmlns:a16="http://schemas.microsoft.com/office/drawing/2014/main" id="{651284EE-5B0E-BB8A-2CD7-6BF22E5F2C35}"/>
+              <a:rPr lang="en-US" sz="1200" dirty="0"/>
+              <a:t>Set of sequences</a:t>
+            </a:r>
+          </a:p>
+        </p:txBody>
+      </p:sp>
+      <p:sp>
+        <p:nvSpPr>
+          <p:cNvPr id="8" name="TextBox 7">
+            <a:extLst>
+              <a:ext uri="{FF2B5EF4-FFF2-40B4-BE49-F238E27FC236}">
+                <a16:creationId xmlns:a16="http://schemas.microsoft.com/office/drawing/2014/main" id="{4F953842-81A1-BD04-07D6-2BA957792967}"/>
               </a:ext>
             </a:extLst>
           </p:cNvPr>
@@ -3477,8 +3922,8 @@
         </p:nvSpPr>
         <p:spPr>
           <a:xfrm>
-            <a:off x="786854" y="84717"/>
-            <a:ext cx="2057400" cy="276999"/>
+            <a:off x="2830029" y="-105868"/>
+            <a:ext cx="2057400" cy="461665"/>
           </a:xfrm>
           <a:prstGeom prst="rect">
             <a:avLst/>
@@ -3491,19 +3936,20 @@
           </a:bodyPr>
           <a:lstStyle/>
           <a:p>
+            <a:pPr algn="ctr"/>
             <a:r>
               <a:rPr lang="en-US" sz="1200" dirty="0"/>
-              <a:t>Set of sequences</a:t>
-            </a:r>
-          </a:p>
-        </p:txBody>
-      </p:sp>
-      <p:sp>
-        <p:nvSpPr>
-          <p:cNvPr id="8" name="TextBox 7">
-            <a:extLst>
-              <a:ext uri="{FF2B5EF4-FFF2-40B4-BE49-F238E27FC236}">
-                <a16:creationId xmlns:a16="http://schemas.microsoft.com/office/drawing/2014/main" id="{4F953842-81A1-BD04-07D6-2BA957792967}"/>
+              <a:t>Clade assignment model (reference tree)</a:t>
+            </a:r>
+          </a:p>
+        </p:txBody>
+      </p:sp>
+      <p:sp>
+        <p:nvSpPr>
+          <p:cNvPr id="9" name="TextBox 8">
+            <a:extLst>
+              <a:ext uri="{FF2B5EF4-FFF2-40B4-BE49-F238E27FC236}">
+                <a16:creationId xmlns:a16="http://schemas.microsoft.com/office/drawing/2014/main" id="{3AD5156D-CFA8-B432-8EBD-2B8179C80791}"/>
               </a:ext>
             </a:extLst>
           </p:cNvPr>
@@ -3512,8 +3958,8 @@
         </p:nvSpPr>
         <p:spPr>
           <a:xfrm>
-            <a:off x="2989930" y="84717"/>
-            <a:ext cx="2057400" cy="461665"/>
+            <a:off x="5141655" y="24123"/>
+            <a:ext cx="2057400" cy="276999"/>
           </a:xfrm>
           <a:prstGeom prst="rect">
             <a:avLst/>
@@ -3529,17 +3975,17 @@
             <a:pPr algn="ctr"/>
             <a:r>
               <a:rPr lang="en-US" sz="1200" dirty="0"/>
-              <a:t>Clade assignment model (reference tree)</a:t>
-            </a:r>
-          </a:p>
-        </p:txBody>
-      </p:sp>
-      <p:sp>
-        <p:nvSpPr>
-          <p:cNvPr id="9" name="TextBox 8">
-            <a:extLst>
-              <a:ext uri="{FF2B5EF4-FFF2-40B4-BE49-F238E27FC236}">
-                <a16:creationId xmlns:a16="http://schemas.microsoft.com/office/drawing/2014/main" id="{3AD5156D-CFA8-B432-8EBD-2B8179C80791}"/>
+              <a:t>Clade designation</a:t>
+            </a:r>
+          </a:p>
+        </p:txBody>
+      </p:sp>
+      <p:sp>
+        <p:nvSpPr>
+          <p:cNvPr id="10" name="TextBox 9">
+            <a:extLst>
+              <a:ext uri="{FF2B5EF4-FFF2-40B4-BE49-F238E27FC236}">
+                <a16:creationId xmlns:a16="http://schemas.microsoft.com/office/drawing/2014/main" id="{85684A52-CE16-2A10-BB81-C97C51C3A4DD}"/>
               </a:ext>
             </a:extLst>
           </p:cNvPr>
@@ -3548,43 +3994,7 @@
         </p:nvSpPr>
         <p:spPr>
           <a:xfrm>
-            <a:off x="5193006" y="98162"/>
-            <a:ext cx="2057400" cy="276999"/>
-          </a:xfrm>
-          <a:prstGeom prst="rect">
-            <a:avLst/>
-          </a:prstGeom>
-          <a:noFill/>
-        </p:spPr>
-        <p:txBody>
-          <a:bodyPr wrap="square" rtlCol="0">
-            <a:spAutoFit/>
-          </a:bodyPr>
-          <a:lstStyle/>
-          <a:p>
-            <a:pPr algn="ctr"/>
-            <a:r>
-              <a:rPr lang="en-US" sz="1200" dirty="0"/>
-              <a:t>Clade designation</a:t>
-            </a:r>
-          </a:p>
-        </p:txBody>
-      </p:sp>
-      <p:sp>
-        <p:nvSpPr>
-          <p:cNvPr id="10" name="TextBox 9">
-            <a:extLst>
-              <a:ext uri="{FF2B5EF4-FFF2-40B4-BE49-F238E27FC236}">
-                <a16:creationId xmlns:a16="http://schemas.microsoft.com/office/drawing/2014/main" id="{85684A52-CE16-2A10-BB81-C97C51C3A4DD}"/>
-              </a:ext>
-            </a:extLst>
-          </p:cNvPr>
-          <p:cNvSpPr txBox="1"/>
-          <p:nvPr/>
-        </p:nvSpPr>
-        <p:spPr>
-          <a:xfrm>
-            <a:off x="9663868" y="110029"/>
+            <a:off x="9666512" y="-111863"/>
             <a:ext cx="2014459" cy="461665"/>
           </a:xfrm>
           <a:prstGeom prst="rect">
@@ -3697,10 +4107,10 @@
           <p:nvPr/>
         </p:nvPicPr>
         <p:blipFill>
-          <a:blip r:embed="rId2">
+          <a:blip r:embed="rId3">
             <a:extLst>
               <a:ext uri="{96DAC541-7B7A-43D3-8B79-37D633B846F1}">
-                <asvg:svgBlip xmlns:asvg="http://schemas.microsoft.com/office/drawing/2016/SVG/main" r:embed="rId3"/>
+                <asvg:svgBlip xmlns:asvg="http://schemas.microsoft.com/office/drawing/2016/SVG/main" r:embed="rId4"/>
               </a:ext>
             </a:extLst>
           </a:blip>
@@ -3733,10 +4143,10 @@
           <p:nvPr/>
         </p:nvPicPr>
         <p:blipFill>
-          <a:blip r:embed="rId4">
+          <a:blip r:embed="rId5">
             <a:extLst>
               <a:ext uri="{96DAC541-7B7A-43D3-8B79-37D633B846F1}">
-                <asvg:svgBlip xmlns:asvg="http://schemas.microsoft.com/office/drawing/2016/SVG/main" r:embed="rId5"/>
+                <asvg:svgBlip xmlns:asvg="http://schemas.microsoft.com/office/drawing/2016/SVG/main" r:embed="rId6"/>
               </a:ext>
             </a:extLst>
           </a:blip>
@@ -3769,10 +4179,10 @@
           <p:nvPr/>
         </p:nvPicPr>
         <p:blipFill>
-          <a:blip r:embed="rId4">
+          <a:blip r:embed="rId5">
             <a:extLst>
               <a:ext uri="{96DAC541-7B7A-43D3-8B79-37D633B846F1}">
-                <asvg:svgBlip xmlns:asvg="http://schemas.microsoft.com/office/drawing/2016/SVG/main" r:embed="rId5"/>
+                <asvg:svgBlip xmlns:asvg="http://schemas.microsoft.com/office/drawing/2016/SVG/main" r:embed="rId6"/>
               </a:ext>
             </a:extLst>
           </a:blip>
@@ -4439,10 +4849,10 @@
           <p:nvPr/>
         </p:nvPicPr>
         <p:blipFill>
-          <a:blip r:embed="rId6">
+          <a:blip r:embed="rId7">
             <a:extLst>
               <a:ext uri="{96DAC541-7B7A-43D3-8B79-37D633B846F1}">
-                <asvg:svgBlip xmlns:asvg="http://schemas.microsoft.com/office/drawing/2016/SVG/main" r:embed="rId7"/>
+                <asvg:svgBlip xmlns:asvg="http://schemas.microsoft.com/office/drawing/2016/SVG/main" r:embed="rId8"/>
               </a:ext>
             </a:extLst>
           </a:blip>
@@ -4475,10 +4885,10 @@
           <p:nvPr/>
         </p:nvPicPr>
         <p:blipFill>
-          <a:blip r:embed="rId8">
+          <a:blip r:embed="rId9">
             <a:extLst>
               <a:ext uri="{96DAC541-7B7A-43D3-8B79-37D633B846F1}">
-                <asvg:svgBlip xmlns:asvg="http://schemas.microsoft.com/office/drawing/2016/SVG/main" r:embed="rId9"/>
+                <asvg:svgBlip xmlns:asvg="http://schemas.microsoft.com/office/drawing/2016/SVG/main" r:embed="rId10"/>
               </a:ext>
             </a:extLst>
           </a:blip>
@@ -4511,10 +4921,10 @@
           <p:nvPr/>
         </p:nvPicPr>
         <p:blipFill>
-          <a:blip r:embed="rId2">
+          <a:blip r:embed="rId3">
             <a:extLst>
               <a:ext uri="{96DAC541-7B7A-43D3-8B79-37D633B846F1}">
-                <asvg:svgBlip xmlns:asvg="http://schemas.microsoft.com/office/drawing/2016/SVG/main" r:embed="rId3"/>
+                <asvg:svgBlip xmlns:asvg="http://schemas.microsoft.com/office/drawing/2016/SVG/main" r:embed="rId4"/>
               </a:ext>
             </a:extLst>
           </a:blip>
@@ -4654,7 +5064,7 @@
         </p:nvCxnSpPr>
         <p:spPr>
           <a:xfrm flipH="1">
-            <a:off x="9939836" y="1652807"/>
+            <a:off x="9933887" y="1663897"/>
             <a:ext cx="1590907" cy="0"/>
           </a:xfrm>
           <a:prstGeom prst="line">
@@ -5103,7 +5513,7 @@
         </p:nvCxnSpPr>
         <p:spPr>
           <a:xfrm>
-            <a:off x="9223732" y="2455104"/>
+            <a:off x="9320006" y="2773747"/>
             <a:ext cx="260195" cy="7503"/>
           </a:xfrm>
           <a:prstGeom prst="straightConnector1">
@@ -5142,7 +5552,7 @@
         </p:nvSpPr>
         <p:spPr>
           <a:xfrm rot="19233967">
-            <a:off x="526473" y="2069486"/>
+            <a:off x="622747" y="2388129"/>
             <a:ext cx="1042147" cy="276999"/>
           </a:xfrm>
           <a:prstGeom prst="rect">
@@ -5180,7 +5590,7 @@
         </p:nvSpPr>
         <p:spPr>
           <a:xfrm rot="19371636">
-            <a:off x="542062" y="2586221"/>
+            <a:off x="638336" y="2904864"/>
             <a:ext cx="1042147" cy="276999"/>
           </a:xfrm>
           <a:prstGeom prst="rect">
@@ -5219,10 +5629,10 @@
           <p:nvPr/>
         </p:nvPicPr>
         <p:blipFill>
-          <a:blip r:embed="rId4">
+          <a:blip r:embed="rId5">
             <a:extLst>
               <a:ext uri="{96DAC541-7B7A-43D3-8B79-37D633B846F1}">
-                <asvg:svgBlip xmlns:asvg="http://schemas.microsoft.com/office/drawing/2016/SVG/main" r:embed="rId5"/>
+                <asvg:svgBlip xmlns:asvg="http://schemas.microsoft.com/office/drawing/2016/SVG/main" r:embed="rId6"/>
               </a:ext>
             </a:extLst>
           </a:blip>
@@ -5232,7 +5642,7 @@
         </p:blipFill>
         <p:spPr>
           <a:xfrm rot="2967273">
-            <a:off x="771833" y="1686083"/>
+            <a:off x="868107" y="2004726"/>
             <a:ext cx="302212" cy="914400"/>
           </a:xfrm>
           <a:prstGeom prst="rect">
@@ -5255,10 +5665,10 @@
           <p:nvPr/>
         </p:nvPicPr>
         <p:blipFill>
-          <a:blip r:embed="rId4">
+          <a:blip r:embed="rId5">
             <a:extLst>
               <a:ext uri="{96DAC541-7B7A-43D3-8B79-37D633B846F1}">
-                <asvg:svgBlip xmlns:asvg="http://schemas.microsoft.com/office/drawing/2016/SVG/main" r:embed="rId5"/>
+                <asvg:svgBlip xmlns:asvg="http://schemas.microsoft.com/office/drawing/2016/SVG/main" r:embed="rId6"/>
               </a:ext>
             </a:extLst>
           </a:blip>
@@ -5268,7 +5678,7 @@
         </p:blipFill>
         <p:spPr>
           <a:xfrm rot="2967273">
-            <a:off x="803591" y="2136316"/>
+            <a:off x="899865" y="2454959"/>
             <a:ext cx="302212" cy="914400"/>
           </a:xfrm>
           <a:prstGeom prst="rect">
@@ -5290,7 +5700,7 @@
         </p:nvSpPr>
         <p:spPr>
           <a:xfrm rot="19233967">
-            <a:off x="1625348" y="2893897"/>
+            <a:off x="1721622" y="3212540"/>
             <a:ext cx="1042147" cy="276999"/>
           </a:xfrm>
           <a:prstGeom prst="rect">
@@ -5328,7 +5738,7 @@
         </p:nvSpPr>
         <p:spPr>
           <a:xfrm rot="19107639">
-            <a:off x="573595" y="3038201"/>
+            <a:off x="669869" y="3356844"/>
             <a:ext cx="1042147" cy="276999"/>
           </a:xfrm>
           <a:prstGeom prst="rect">
@@ -5367,10 +5777,10 @@
           <p:nvPr/>
         </p:nvPicPr>
         <p:blipFill>
-          <a:blip r:embed="rId4">
+          <a:blip r:embed="rId5">
             <a:extLst>
               <a:ext uri="{96DAC541-7B7A-43D3-8B79-37D633B846F1}">
-                <asvg:svgBlip xmlns:asvg="http://schemas.microsoft.com/office/drawing/2016/SVG/main" r:embed="rId5"/>
+                <asvg:svgBlip xmlns:asvg="http://schemas.microsoft.com/office/drawing/2016/SVG/main" r:embed="rId6"/>
               </a:ext>
             </a:extLst>
           </a:blip>
@@ -5380,7 +5790,7 @@
         </p:blipFill>
         <p:spPr>
           <a:xfrm rot="2967273">
-            <a:off x="1888882" y="2472980"/>
+            <a:off x="1985156" y="2791623"/>
             <a:ext cx="302212" cy="914400"/>
           </a:xfrm>
           <a:prstGeom prst="rect">
@@ -5403,10 +5813,10 @@
           <p:nvPr/>
         </p:nvPicPr>
         <p:blipFill>
-          <a:blip r:embed="rId4">
+          <a:blip r:embed="rId5">
             <a:extLst>
               <a:ext uri="{96DAC541-7B7A-43D3-8B79-37D633B846F1}">
-                <asvg:svgBlip xmlns:asvg="http://schemas.microsoft.com/office/drawing/2016/SVG/main" r:embed="rId5"/>
+                <asvg:svgBlip xmlns:asvg="http://schemas.microsoft.com/office/drawing/2016/SVG/main" r:embed="rId6"/>
               </a:ext>
             </a:extLst>
           </a:blip>
@@ -5416,7 +5826,7 @@
         </p:blipFill>
         <p:spPr>
           <a:xfrm rot="2967273">
-            <a:off x="838449" y="2620437"/>
+            <a:off x="934723" y="2939080"/>
             <a:ext cx="302212" cy="914400"/>
           </a:xfrm>
           <a:prstGeom prst="rect">
@@ -5438,7 +5848,7 @@
         </p:nvCxnSpPr>
         <p:spPr>
           <a:xfrm>
-            <a:off x="3073274" y="2042583"/>
+            <a:off x="3169548" y="2361226"/>
             <a:ext cx="786107" cy="310895"/>
           </a:xfrm>
           <a:prstGeom prst="bentConnector3">
@@ -5479,7 +5889,7 @@
         </p:nvCxnSpPr>
         <p:spPr>
           <a:xfrm>
-            <a:off x="3859381" y="2237187"/>
+            <a:off x="3955655" y="2555830"/>
             <a:ext cx="0" cy="299180"/>
           </a:xfrm>
           <a:prstGeom prst="line">
@@ -5522,7 +5932,7 @@
         </p:nvCxnSpPr>
         <p:spPr>
           <a:xfrm flipH="1">
-            <a:off x="3859381" y="2536367"/>
+            <a:off x="3955655" y="2855010"/>
             <a:ext cx="781550" cy="0"/>
           </a:xfrm>
           <a:prstGeom prst="line">
@@ -5565,7 +5975,7 @@
         </p:nvCxnSpPr>
         <p:spPr>
           <a:xfrm flipH="1">
-            <a:off x="3859381" y="2237187"/>
+            <a:off x="3955655" y="2555830"/>
             <a:ext cx="256478" cy="0"/>
           </a:xfrm>
           <a:prstGeom prst="line">
@@ -5608,7 +6018,7 @@
         </p:nvCxnSpPr>
         <p:spPr>
           <a:xfrm>
-            <a:off x="3466327" y="1825159"/>
+            <a:off x="3562601" y="2143802"/>
             <a:ext cx="0" cy="221058"/>
           </a:xfrm>
           <a:prstGeom prst="line">
@@ -5646,7 +6056,7 @@
         </p:nvCxnSpPr>
         <p:spPr>
           <a:xfrm>
-            <a:off x="3466327" y="1825159"/>
+            <a:off x="3562601" y="2143802"/>
             <a:ext cx="718587" cy="0"/>
           </a:xfrm>
           <a:prstGeom prst="line">
@@ -5689,7 +6099,7 @@
         </p:nvCxnSpPr>
         <p:spPr>
           <a:xfrm>
-            <a:off x="4115859" y="2123615"/>
+            <a:off x="4212133" y="2442258"/>
             <a:ext cx="0" cy="216921"/>
           </a:xfrm>
           <a:prstGeom prst="line">
@@ -5732,7 +6142,7 @@
         </p:nvCxnSpPr>
         <p:spPr>
           <a:xfrm flipH="1">
-            <a:off x="4115859" y="2123615"/>
+            <a:off x="4212133" y="2442258"/>
             <a:ext cx="308517" cy="0"/>
           </a:xfrm>
           <a:prstGeom prst="line">
@@ -5775,7 +6185,7 @@
         </p:nvCxnSpPr>
         <p:spPr>
           <a:xfrm flipH="1">
-            <a:off x="4114000" y="2340536"/>
+            <a:off x="4210274" y="2659179"/>
             <a:ext cx="526931" cy="0"/>
           </a:xfrm>
           <a:prstGeom prst="line">
@@ -5816,7 +6226,7 @@
         </p:nvSpPr>
         <p:spPr>
           <a:xfrm>
-            <a:off x="4715085" y="1847901"/>
+            <a:off x="4811359" y="2166544"/>
             <a:ext cx="434843" cy="237195"/>
           </a:xfrm>
           <a:prstGeom prst="ellipse">
@@ -5876,7 +6286,7 @@
         </p:nvSpPr>
         <p:spPr>
           <a:xfrm>
-            <a:off x="4640931" y="2277982"/>
+            <a:off x="4737205" y="2596625"/>
             <a:ext cx="240636" cy="192571"/>
           </a:xfrm>
           <a:prstGeom prst="ellipse">
@@ -5936,7 +6346,7 @@
         </p:nvSpPr>
         <p:spPr>
           <a:xfrm>
-            <a:off x="4553659" y="2482059"/>
+            <a:off x="4649933" y="2800702"/>
             <a:ext cx="405837" cy="197875"/>
           </a:xfrm>
           <a:prstGeom prst="ellipse">
@@ -5998,7 +6408,7 @@
         </p:nvCxnSpPr>
         <p:spPr>
           <a:xfrm>
-            <a:off x="4184914" y="1760795"/>
+            <a:off x="4281188" y="2079438"/>
             <a:ext cx="0" cy="213510"/>
           </a:xfrm>
           <a:prstGeom prst="line">
@@ -6036,7 +6446,7 @@
         </p:nvCxnSpPr>
         <p:spPr>
           <a:xfrm flipH="1">
-            <a:off x="4184914" y="1973310"/>
+            <a:off x="4281188" y="2291953"/>
             <a:ext cx="661000" cy="8812"/>
           </a:xfrm>
           <a:prstGeom prst="line">
@@ -6074,7 +6484,7 @@
         </p:nvCxnSpPr>
         <p:spPr>
           <a:xfrm flipH="1">
-            <a:off x="4184914" y="1760795"/>
+            <a:off x="4281188" y="2079438"/>
             <a:ext cx="253098" cy="0"/>
           </a:xfrm>
           <a:prstGeom prst="line">
@@ -6112,7 +6522,7 @@
         </p:nvCxnSpPr>
         <p:spPr>
           <a:xfrm flipV="1">
-            <a:off x="4452589" y="1679493"/>
+            <a:off x="4548863" y="1998136"/>
             <a:ext cx="0" cy="173351"/>
           </a:xfrm>
           <a:prstGeom prst="line">
@@ -6150,7 +6560,7 @@
         </p:nvCxnSpPr>
         <p:spPr>
           <a:xfrm flipH="1">
-            <a:off x="4456015" y="1679493"/>
+            <a:off x="4552289" y="1998136"/>
             <a:ext cx="268260" cy="0"/>
           </a:xfrm>
           <a:prstGeom prst="line">
@@ -6188,7 +6598,7 @@
         </p:nvCxnSpPr>
         <p:spPr>
           <a:xfrm flipH="1">
-            <a:off x="4456015" y="1852844"/>
+            <a:off x="4552289" y="2171487"/>
             <a:ext cx="268260" cy="0"/>
           </a:xfrm>
           <a:prstGeom prst="line">
@@ -6224,7 +6634,7 @@
         </p:nvSpPr>
         <p:spPr>
           <a:xfrm>
-            <a:off x="4616628" y="1620414"/>
+            <a:off x="4712902" y="1939057"/>
             <a:ext cx="279900" cy="304566"/>
           </a:xfrm>
           <a:prstGeom prst="ellipse">
@@ -6281,7 +6691,7 @@
         </p:nvCxnSpPr>
         <p:spPr>
           <a:xfrm flipV="1">
-            <a:off x="4441482" y="2046217"/>
+            <a:off x="4537756" y="2364860"/>
             <a:ext cx="0" cy="173351"/>
           </a:xfrm>
           <a:prstGeom prst="line">
@@ -6319,7 +6729,7 @@
         </p:nvCxnSpPr>
         <p:spPr>
           <a:xfrm flipH="1">
-            <a:off x="4444908" y="2046217"/>
+            <a:off x="4541182" y="2364860"/>
             <a:ext cx="268260" cy="0"/>
           </a:xfrm>
           <a:prstGeom prst="line">
@@ -6357,7 +6767,7 @@
         </p:nvCxnSpPr>
         <p:spPr>
           <a:xfrm flipH="1">
-            <a:off x="4444908" y="2219568"/>
+            <a:off x="4541182" y="2538211"/>
             <a:ext cx="268260" cy="0"/>
           </a:xfrm>
           <a:prstGeom prst="line">
@@ -6393,7 +6803,7 @@
         </p:nvSpPr>
         <p:spPr>
           <a:xfrm>
-            <a:off x="4627155" y="1989617"/>
+            <a:off x="4723429" y="2308260"/>
             <a:ext cx="279900" cy="304566"/>
           </a:xfrm>
           <a:prstGeom prst="ellipse">
@@ -6451,7 +6861,7 @@
         </p:nvCxnSpPr>
         <p:spPr>
           <a:xfrm>
-            <a:off x="2606625" y="2054036"/>
+            <a:off x="2702899" y="2372679"/>
             <a:ext cx="260195" cy="7503"/>
           </a:xfrm>
           <a:prstGeom prst="straightConnector1">
@@ -6490,7 +6900,7 @@
         </p:nvCxnSpPr>
         <p:spPr>
           <a:xfrm>
-            <a:off x="5107662" y="2116112"/>
+            <a:off x="5203936" y="2434755"/>
             <a:ext cx="260195" cy="7503"/>
           </a:xfrm>
           <a:prstGeom prst="straightConnector1">
@@ -6529,7 +6939,7 @@
         </p:nvSpPr>
         <p:spPr>
           <a:xfrm rot="19233967">
-            <a:off x="5321902" y="2089936"/>
+            <a:off x="5418176" y="2408579"/>
             <a:ext cx="1042147" cy="276999"/>
           </a:xfrm>
           <a:prstGeom prst="rect">
@@ -6567,7 +6977,7 @@
         </p:nvSpPr>
         <p:spPr>
           <a:xfrm rot="19371636">
-            <a:off x="5505109" y="2514946"/>
+            <a:off x="5601383" y="2833589"/>
             <a:ext cx="1042147" cy="276999"/>
           </a:xfrm>
           <a:prstGeom prst="rect">
@@ -6606,10 +7016,10 @@
           <p:nvPr/>
         </p:nvPicPr>
         <p:blipFill>
-          <a:blip r:embed="rId10">
+          <a:blip r:embed="rId11">
             <a:extLst>
               <a:ext uri="{96DAC541-7B7A-43D3-8B79-37D633B846F1}">
-                <asvg:svgBlip xmlns:asvg="http://schemas.microsoft.com/office/drawing/2016/SVG/main" r:embed="rId11"/>
+                <asvg:svgBlip xmlns:asvg="http://schemas.microsoft.com/office/drawing/2016/SVG/main" r:embed="rId12"/>
               </a:ext>
             </a:extLst>
           </a:blip>
@@ -6619,7 +7029,7 @@
         </p:blipFill>
         <p:spPr>
           <a:xfrm rot="2967273">
-            <a:off x="5567262" y="1706533"/>
+            <a:off x="5663536" y="2025176"/>
             <a:ext cx="302212" cy="914400"/>
           </a:xfrm>
           <a:prstGeom prst="rect">
@@ -6642,10 +7052,10 @@
           <p:nvPr/>
         </p:nvPicPr>
         <p:blipFill>
-          <a:blip r:embed="rId8">
+          <a:blip r:embed="rId9">
             <a:extLst>
               <a:ext uri="{96DAC541-7B7A-43D3-8B79-37D633B846F1}">
-                <asvg:svgBlip xmlns:asvg="http://schemas.microsoft.com/office/drawing/2016/SVG/main" r:embed="rId9"/>
+                <asvg:svgBlip xmlns:asvg="http://schemas.microsoft.com/office/drawing/2016/SVG/main" r:embed="rId10"/>
               </a:ext>
             </a:extLst>
           </a:blip>
@@ -6655,7 +7065,7 @@
         </p:blipFill>
         <p:spPr>
           <a:xfrm rot="2967273">
-            <a:off x="5764393" y="2092896"/>
+            <a:off x="5860667" y="2411539"/>
             <a:ext cx="302212" cy="914400"/>
           </a:xfrm>
           <a:prstGeom prst="rect">
@@ -6677,7 +7087,7 @@
         </p:nvSpPr>
         <p:spPr>
           <a:xfrm rot="19233967">
-            <a:off x="6701814" y="2902101"/>
+            <a:off x="6798088" y="3220744"/>
             <a:ext cx="1042147" cy="276999"/>
           </a:xfrm>
           <a:prstGeom prst="rect">
@@ -6715,7 +7125,7 @@
         </p:nvSpPr>
         <p:spPr>
           <a:xfrm rot="19128486">
-            <a:off x="5636862" y="3013152"/>
+            <a:off x="5733136" y="3331795"/>
             <a:ext cx="1042147" cy="276999"/>
           </a:xfrm>
           <a:prstGeom prst="rect">
@@ -6754,10 +7164,10 @@
           <p:nvPr/>
         </p:nvPicPr>
         <p:blipFill>
-          <a:blip r:embed="rId12">
+          <a:blip r:embed="rId13">
             <a:extLst>
               <a:ext uri="{96DAC541-7B7A-43D3-8B79-37D633B846F1}">
-                <asvg:svgBlip xmlns:asvg="http://schemas.microsoft.com/office/drawing/2016/SVG/main" r:embed="rId13"/>
+                <asvg:svgBlip xmlns:asvg="http://schemas.microsoft.com/office/drawing/2016/SVG/main" r:embed="rId14"/>
               </a:ext>
             </a:extLst>
           </a:blip>
@@ -6767,7 +7177,7 @@
         </p:blipFill>
         <p:spPr>
           <a:xfrm rot="2967273">
-            <a:off x="6978705" y="2468394"/>
+            <a:off x="7074979" y="2787037"/>
             <a:ext cx="302212" cy="914400"/>
           </a:xfrm>
           <a:prstGeom prst="rect">
@@ -6790,10 +7200,10 @@
           <p:nvPr/>
         </p:nvPicPr>
         <p:blipFill>
-          <a:blip r:embed="rId12">
+          <a:blip r:embed="rId13">
             <a:extLst>
               <a:ext uri="{96DAC541-7B7A-43D3-8B79-37D633B846F1}">
-                <asvg:svgBlip xmlns:asvg="http://schemas.microsoft.com/office/drawing/2016/SVG/main" r:embed="rId13"/>
+                <asvg:svgBlip xmlns:asvg="http://schemas.microsoft.com/office/drawing/2016/SVG/main" r:embed="rId14"/>
               </a:ext>
             </a:extLst>
           </a:blip>
@@ -6803,7 +7213,7 @@
         </p:blipFill>
         <p:spPr>
           <a:xfrm rot="2967273">
-            <a:off x="5908608" y="2571553"/>
+            <a:off x="6004882" y="2890196"/>
             <a:ext cx="302212" cy="914400"/>
           </a:xfrm>
           <a:prstGeom prst="rect">
@@ -6825,7 +7235,7 @@
         </p:nvSpPr>
         <p:spPr>
           <a:xfrm>
-            <a:off x="6094172" y="1775936"/>
+            <a:off x="6190446" y="2094579"/>
             <a:ext cx="290464" cy="276999"/>
           </a:xfrm>
           <a:prstGeom prst="rect">
@@ -6861,10 +7271,10 @@
           <p:nvPr/>
         </p:nvPicPr>
         <p:blipFill>
-          <a:blip r:embed="rId2">
+          <a:blip r:embed="rId3">
             <a:extLst>
               <a:ext uri="{96DAC541-7B7A-43D3-8B79-37D633B846F1}">
-                <asvg:svgBlip xmlns:asvg="http://schemas.microsoft.com/office/drawing/2016/SVG/main" r:embed="rId3"/>
+                <asvg:svgBlip xmlns:asvg="http://schemas.microsoft.com/office/drawing/2016/SVG/main" r:embed="rId4"/>
               </a:ext>
             </a:extLst>
           </a:blip>
@@ -6874,7 +7284,7 @@
         </p:blipFill>
         <p:spPr>
           <a:xfrm rot="20175687">
-            <a:off x="6004283" y="1689088"/>
+            <a:off x="6100557" y="2007731"/>
             <a:ext cx="434846" cy="434846"/>
           </a:xfrm>
           <a:prstGeom prst="rect">
@@ -6897,10 +7307,10 @@
           <p:nvPr/>
         </p:nvPicPr>
         <p:blipFill>
-          <a:blip r:embed="rId2">
+          <a:blip r:embed="rId3">
             <a:extLst>
               <a:ext uri="{96DAC541-7B7A-43D3-8B79-37D633B846F1}">
-                <asvg:svgBlip xmlns:asvg="http://schemas.microsoft.com/office/drawing/2016/SVG/main" r:embed="rId3"/>
+                <asvg:svgBlip xmlns:asvg="http://schemas.microsoft.com/office/drawing/2016/SVG/main" r:embed="rId4"/>
               </a:ext>
             </a:extLst>
           </a:blip>
@@ -6910,7 +7320,7 @@
         </p:blipFill>
         <p:spPr>
           <a:xfrm rot="20175687">
-            <a:off x="6208254" y="2086894"/>
+            <a:off x="6304528" y="2405537"/>
             <a:ext cx="434846" cy="434846"/>
           </a:xfrm>
           <a:prstGeom prst="rect">
@@ -6932,7 +7342,7 @@
         </p:nvSpPr>
         <p:spPr>
           <a:xfrm>
-            <a:off x="6314022" y="2180222"/>
+            <a:off x="6410296" y="2498865"/>
             <a:ext cx="277640" cy="276999"/>
           </a:xfrm>
           <a:prstGeom prst="rect">
@@ -6968,10 +7378,10 @@
           <p:nvPr/>
         </p:nvPicPr>
         <p:blipFill>
-          <a:blip r:embed="rId2">
+          <a:blip r:embed="rId3">
             <a:extLst>
               <a:ext uri="{96DAC541-7B7A-43D3-8B79-37D633B846F1}">
-                <asvg:svgBlip xmlns:asvg="http://schemas.microsoft.com/office/drawing/2016/SVG/main" r:embed="rId3"/>
+                <asvg:svgBlip xmlns:asvg="http://schemas.microsoft.com/office/drawing/2016/SVG/main" r:embed="rId4"/>
               </a:ext>
             </a:extLst>
           </a:blip>
@@ -6981,7 +7391,7 @@
         </p:blipFill>
         <p:spPr>
           <a:xfrm rot="20175687">
-            <a:off x="7410908" y="2449656"/>
+            <a:off x="7507182" y="2768299"/>
             <a:ext cx="434846" cy="446275"/>
           </a:xfrm>
           <a:prstGeom prst="rect">
@@ -7003,7 +7413,7 @@
         </p:nvSpPr>
         <p:spPr>
           <a:xfrm flipH="1">
-            <a:off x="7521345" y="2562518"/>
+            <a:off x="7617619" y="2881161"/>
             <a:ext cx="255597" cy="276999"/>
           </a:xfrm>
           <a:prstGeom prst="rect">
@@ -7039,10 +7449,10 @@
           <p:nvPr/>
         </p:nvPicPr>
         <p:blipFill>
-          <a:blip r:embed="rId2">
+          <a:blip r:embed="rId3">
             <a:extLst>
               <a:ext uri="{96DAC541-7B7A-43D3-8B79-37D633B846F1}">
-                <asvg:svgBlip xmlns:asvg="http://schemas.microsoft.com/office/drawing/2016/SVG/main" r:embed="rId3"/>
+                <asvg:svgBlip xmlns:asvg="http://schemas.microsoft.com/office/drawing/2016/SVG/main" r:embed="rId4"/>
               </a:ext>
             </a:extLst>
           </a:blip>
@@ -7052,7 +7462,7 @@
         </p:blipFill>
         <p:spPr>
           <a:xfrm rot="20175687">
-            <a:off x="6352752" y="2562715"/>
+            <a:off x="6449026" y="2881358"/>
             <a:ext cx="434846" cy="446275"/>
           </a:xfrm>
           <a:prstGeom prst="rect">
@@ -7074,7 +7484,7 @@
         </p:nvSpPr>
         <p:spPr>
           <a:xfrm>
-            <a:off x="6463399" y="2673065"/>
+            <a:off x="6559673" y="2991708"/>
             <a:ext cx="269626" cy="276999"/>
           </a:xfrm>
           <a:prstGeom prst="rect">
@@ -8441,7 +8851,7 @@
         </p:nvCxnSpPr>
         <p:spPr>
           <a:xfrm>
-            <a:off x="9939836" y="2352484"/>
+            <a:off x="10036110" y="2671127"/>
             <a:ext cx="0" cy="854686"/>
           </a:xfrm>
           <a:prstGeom prst="line">
@@ -8479,7 +8889,7 @@
         </p:nvCxnSpPr>
         <p:spPr>
           <a:xfrm flipH="1">
-            <a:off x="9939836" y="3196080"/>
+            <a:off x="10036110" y="3514723"/>
             <a:ext cx="1590907" cy="0"/>
           </a:xfrm>
           <a:prstGeom prst="line">
@@ -8515,7 +8925,7 @@
         </p:nvSpPr>
         <p:spPr>
           <a:xfrm>
-            <a:off x="10006743" y="2418753"/>
+            <a:off x="10103017" y="2737396"/>
             <a:ext cx="1445196" cy="635896"/>
           </a:xfrm>
           <a:custGeom>
@@ -8617,7 +9027,7 @@
         </p:nvSpPr>
         <p:spPr>
           <a:xfrm>
-            <a:off x="10014177" y="2493094"/>
+            <a:off x="10110451" y="2811737"/>
             <a:ext cx="1434791" cy="572430"/>
           </a:xfrm>
           <a:custGeom>
@@ -8733,7 +9143,7 @@
         </p:nvSpPr>
         <p:spPr>
           <a:xfrm>
-            <a:off x="10006743" y="3072958"/>
+            <a:off x="10103017" y="3391601"/>
             <a:ext cx="1427356" cy="52039"/>
           </a:xfrm>
           <a:custGeom>
@@ -8815,7 +9225,7 @@
         </p:nvSpPr>
         <p:spPr>
           <a:xfrm>
-            <a:off x="10616036" y="3233294"/>
+            <a:off x="10712310" y="3551937"/>
             <a:ext cx="512956" cy="276999"/>
           </a:xfrm>
           <a:prstGeom prst="rect">
@@ -8850,7 +9260,7 @@
         </p:nvSpPr>
         <p:spPr>
           <a:xfrm>
-            <a:off x="9666512" y="2581677"/>
+            <a:off x="9762786" y="2900320"/>
             <a:ext cx="239871" cy="369332"/>
           </a:xfrm>
           <a:prstGeom prst="rect">
@@ -8925,10 +9335,10 @@
           <p:nvPr/>
         </p:nvPicPr>
         <p:blipFill>
-          <a:blip r:embed="rId14">
+          <a:blip r:embed="rId15">
             <a:extLst>
               <a:ext uri="{96DAC541-7B7A-43D3-8B79-37D633B846F1}">
-                <asvg:svgBlip xmlns:asvg="http://schemas.microsoft.com/office/drawing/2016/SVG/main" r:embed="rId15"/>
+                <asvg:svgBlip xmlns:asvg="http://schemas.microsoft.com/office/drawing/2016/SVG/main" r:embed="rId16"/>
               </a:ext>
             </a:extLst>
           </a:blip>
@@ -8938,7 +9348,7 @@
         </p:blipFill>
         <p:spPr>
           <a:xfrm>
-            <a:off x="9090439" y="2183186"/>
+            <a:off x="9186713" y="2501829"/>
             <a:ext cx="526779" cy="526779"/>
           </a:xfrm>
           <a:prstGeom prst="rect">
@@ -8999,7 +9409,7 @@
         </p:nvSpPr>
         <p:spPr>
           <a:xfrm>
-            <a:off x="10093918" y="2914706"/>
+            <a:off x="10190192" y="3233349"/>
             <a:ext cx="45719" cy="82502"/>
           </a:xfrm>
           <a:prstGeom prst="ellipse">
@@ -9051,7 +9461,7 @@
         </p:nvSpPr>
         <p:spPr>
           <a:xfrm>
-            <a:off x="10094544" y="2860110"/>
+            <a:off x="10190818" y="3178753"/>
             <a:ext cx="45719" cy="82502"/>
           </a:xfrm>
           <a:prstGeom prst="ellipse">
@@ -9103,7 +9513,7 @@
         </p:nvSpPr>
         <p:spPr>
           <a:xfrm>
-            <a:off x="10981618" y="2406251"/>
+            <a:off x="11077892" y="2724894"/>
             <a:ext cx="45719" cy="82502"/>
           </a:xfrm>
           <a:prstGeom prst="ellipse">
@@ -9155,7 +9565,7 @@
         </p:nvSpPr>
         <p:spPr>
           <a:xfrm>
-            <a:off x="10095777" y="2810407"/>
+            <a:off x="10192051" y="3129050"/>
             <a:ext cx="45719" cy="82502"/>
           </a:xfrm>
           <a:prstGeom prst="ellipse">
@@ -9263,7 +9673,7 @@
         </p:nvSpPr>
         <p:spPr>
           <a:xfrm>
-            <a:off x="10568713" y="1701048"/>
+            <a:off x="10671097" y="1721137"/>
             <a:ext cx="512956" cy="276999"/>
           </a:xfrm>
           <a:prstGeom prst="rect">
@@ -9333,7 +9743,7 @@
         </p:nvSpPr>
         <p:spPr>
           <a:xfrm>
-            <a:off x="704977" y="3491842"/>
+            <a:off x="801251" y="3810485"/>
             <a:ext cx="789545" cy="276999"/>
           </a:xfrm>
           <a:prstGeom prst="rect">
@@ -9376,7 +9786,7 @@
         </p:nvSpPr>
         <p:spPr>
           <a:xfrm>
-            <a:off x="1788156" y="3513874"/>
+            <a:off x="1884430" y="3832517"/>
             <a:ext cx="789545" cy="276999"/>
           </a:xfrm>
           <a:prstGeom prst="rect">
@@ -9462,7 +9872,7 @@
         </p:nvSpPr>
         <p:spPr>
           <a:xfrm>
-            <a:off x="5707088" y="3470348"/>
+            <a:off x="5803362" y="3788991"/>
             <a:ext cx="789545" cy="276999"/>
           </a:xfrm>
           <a:prstGeom prst="rect">
@@ -9505,7 +9915,7 @@
         </p:nvSpPr>
         <p:spPr>
           <a:xfrm>
-            <a:off x="6985644" y="3454779"/>
+            <a:off x="7081918" y="3773422"/>
             <a:ext cx="789545" cy="276999"/>
           </a:xfrm>
           <a:prstGeom prst="rect">
@@ -9548,7 +9958,7 @@
         </p:nvSpPr>
         <p:spPr>
           <a:xfrm>
-            <a:off x="7224252" y="117553"/>
+            <a:off x="7392703" y="24123"/>
             <a:ext cx="2057400" cy="276999"/>
           </a:xfrm>
           <a:prstGeom prst="rect">
@@ -9586,7 +9996,7 @@
         </p:nvCxnSpPr>
         <p:spPr>
           <a:xfrm flipH="1">
-            <a:off x="8231522" y="1667771"/>
+            <a:off x="8230815" y="1663897"/>
             <a:ext cx="851433" cy="10838"/>
           </a:xfrm>
           <a:prstGeom prst="line">
@@ -9795,7 +10205,7 @@
         </p:nvSpPr>
         <p:spPr>
           <a:xfrm>
-            <a:off x="8561615" y="1689499"/>
+            <a:off x="8511478" y="1691986"/>
             <a:ext cx="512956" cy="276999"/>
           </a:xfrm>
           <a:prstGeom prst="rect">
@@ -9869,7 +10279,7 @@
         </p:nvCxnSpPr>
         <p:spPr>
           <a:xfrm>
-            <a:off x="7041128" y="2340536"/>
+            <a:off x="7137402" y="2659179"/>
             <a:ext cx="260195" cy="7503"/>
           </a:xfrm>
           <a:prstGeom prst="straightConnector1">
@@ -9910,7 +10320,7 @@
         </p:nvCxnSpPr>
         <p:spPr>
           <a:xfrm flipH="1">
-            <a:off x="8207697" y="3252620"/>
+            <a:off x="8303971" y="3571263"/>
             <a:ext cx="851433" cy="10838"/>
           </a:xfrm>
           <a:prstGeom prst="line">
@@ -9946,7 +10356,7 @@
         </p:nvSpPr>
         <p:spPr>
           <a:xfrm>
-            <a:off x="8368144" y="2884171"/>
+            <a:off x="8464418" y="3202814"/>
             <a:ext cx="193965" cy="347158"/>
           </a:xfrm>
           <a:prstGeom prst="rect">
@@ -9995,7 +10405,7 @@
         </p:nvSpPr>
         <p:spPr>
           <a:xfrm>
-            <a:off x="8368642" y="2518152"/>
+            <a:off x="8464916" y="2836795"/>
             <a:ext cx="193965" cy="347158"/>
           </a:xfrm>
           <a:prstGeom prst="rect">
@@ -10046,7 +10456,7 @@
         </p:nvCxnSpPr>
         <p:spPr>
           <a:xfrm>
-            <a:off x="8211468" y="2130347"/>
+            <a:off x="8307742" y="2448990"/>
             <a:ext cx="0" cy="1126587"/>
           </a:xfrm>
           <a:prstGeom prst="line">
@@ -10082,7 +10492,7 @@
         </p:nvSpPr>
         <p:spPr>
           <a:xfrm>
-            <a:off x="7849824" y="2452679"/>
+            <a:off x="7946098" y="2771322"/>
             <a:ext cx="314510" cy="369332"/>
           </a:xfrm>
           <a:prstGeom prst="rect">
@@ -10119,7 +10529,7 @@
         </p:nvSpPr>
         <p:spPr>
           <a:xfrm>
-            <a:off x="8534332" y="3348911"/>
+            <a:off x="8630606" y="3667554"/>
             <a:ext cx="512956" cy="276999"/>
           </a:xfrm>
           <a:prstGeom prst="rect">
@@ -10154,7 +10564,7 @@
         </p:nvSpPr>
         <p:spPr>
           <a:xfrm>
-            <a:off x="8367133" y="2166957"/>
+            <a:off x="8463407" y="2485600"/>
             <a:ext cx="193965" cy="347158"/>
           </a:xfrm>
           <a:prstGeom prst="rect">
@@ -10203,7 +10613,7 @@
         </p:nvSpPr>
         <p:spPr>
           <a:xfrm>
-            <a:off x="8718238" y="2904058"/>
+            <a:off x="8814512" y="3222701"/>
             <a:ext cx="193965" cy="324917"/>
           </a:xfrm>
           <a:prstGeom prst="rect">
@@ -10372,10 +10782,10 @@
           <p:nvPr/>
         </p:nvPicPr>
         <p:blipFill>
-          <a:blip r:embed="rId4">
+          <a:blip r:embed="rId5">
             <a:extLst>
               <a:ext uri="{96DAC541-7B7A-43D3-8B79-37D633B846F1}">
-                <asvg:svgBlip xmlns:asvg="http://schemas.microsoft.com/office/drawing/2016/SVG/main" r:embed="rId5"/>
+                <asvg:svgBlip xmlns:asvg="http://schemas.microsoft.com/office/drawing/2016/SVG/main" r:embed="rId6"/>
               </a:ext>
             </a:extLst>
           </a:blip>
@@ -10408,10 +10818,10 @@
           <p:nvPr/>
         </p:nvPicPr>
         <p:blipFill>
-          <a:blip r:embed="rId4">
+          <a:blip r:embed="rId5">
             <a:extLst>
               <a:ext uri="{96DAC541-7B7A-43D3-8B79-37D633B846F1}">
-                <asvg:svgBlip xmlns:asvg="http://schemas.microsoft.com/office/drawing/2016/SVG/main" r:embed="rId5"/>
+                <asvg:svgBlip xmlns:asvg="http://schemas.microsoft.com/office/drawing/2016/SVG/main" r:embed="rId6"/>
               </a:ext>
             </a:extLst>
           </a:blip>
@@ -10520,10 +10930,10 @@
           <p:nvPr/>
         </p:nvPicPr>
         <p:blipFill>
-          <a:blip r:embed="rId4">
+          <a:blip r:embed="rId5">
             <a:extLst>
               <a:ext uri="{96DAC541-7B7A-43D3-8B79-37D633B846F1}">
-                <asvg:svgBlip xmlns:asvg="http://schemas.microsoft.com/office/drawing/2016/SVG/main" r:embed="rId5"/>
+                <asvg:svgBlip xmlns:asvg="http://schemas.microsoft.com/office/drawing/2016/SVG/main" r:embed="rId6"/>
               </a:ext>
             </a:extLst>
           </a:blip>
@@ -10556,10 +10966,10 @@
           <p:nvPr/>
         </p:nvPicPr>
         <p:blipFill>
-          <a:blip r:embed="rId4">
+          <a:blip r:embed="rId5">
             <a:extLst>
               <a:ext uri="{96DAC541-7B7A-43D3-8B79-37D633B846F1}">
-                <asvg:svgBlip xmlns:asvg="http://schemas.microsoft.com/office/drawing/2016/SVG/main" r:embed="rId5"/>
+                <asvg:svgBlip xmlns:asvg="http://schemas.microsoft.com/office/drawing/2016/SVG/main" r:embed="rId6"/>
               </a:ext>
             </a:extLst>
           </a:blip>
@@ -10754,10 +11164,10 @@
           <p:nvPr/>
         </p:nvPicPr>
         <p:blipFill>
-          <a:blip r:embed="rId8">
+          <a:blip r:embed="rId9">
             <a:extLst>
               <a:ext uri="{96DAC541-7B7A-43D3-8B79-37D633B846F1}">
-                <asvg:svgBlip xmlns:asvg="http://schemas.microsoft.com/office/drawing/2016/SVG/main" r:embed="rId9"/>
+                <asvg:svgBlip xmlns:asvg="http://schemas.microsoft.com/office/drawing/2016/SVG/main" r:embed="rId10"/>
               </a:ext>
             </a:extLst>
           </a:blip>
@@ -10866,10 +11276,10 @@
           <p:nvPr/>
         </p:nvPicPr>
         <p:blipFill>
-          <a:blip r:embed="rId6">
+          <a:blip r:embed="rId7">
             <a:extLst>
               <a:ext uri="{96DAC541-7B7A-43D3-8B79-37D633B846F1}">
-                <asvg:svgBlip xmlns:asvg="http://schemas.microsoft.com/office/drawing/2016/SVG/main" r:embed="rId16"/>
+                <asvg:svgBlip xmlns:asvg="http://schemas.microsoft.com/office/drawing/2016/SVG/main" r:embed="rId17"/>
               </a:ext>
             </a:extLst>
           </a:blip>
@@ -10937,10 +11347,10 @@
           <p:nvPr/>
         </p:nvPicPr>
         <p:blipFill>
-          <a:blip r:embed="rId2">
+          <a:blip r:embed="rId3">
             <a:extLst>
               <a:ext uri="{96DAC541-7B7A-43D3-8B79-37D633B846F1}">
-                <asvg:svgBlip xmlns:asvg="http://schemas.microsoft.com/office/drawing/2016/SVG/main" r:embed="rId3"/>
+                <asvg:svgBlip xmlns:asvg="http://schemas.microsoft.com/office/drawing/2016/SVG/main" r:embed="rId4"/>
               </a:ext>
             </a:extLst>
           </a:blip>
@@ -11008,10 +11418,10 @@
           <p:nvPr/>
         </p:nvPicPr>
         <p:blipFill>
-          <a:blip r:embed="rId2">
+          <a:blip r:embed="rId3">
             <a:extLst>
               <a:ext uri="{96DAC541-7B7A-43D3-8B79-37D633B846F1}">
-                <asvg:svgBlip xmlns:asvg="http://schemas.microsoft.com/office/drawing/2016/SVG/main" r:embed="rId3"/>
+                <asvg:svgBlip xmlns:asvg="http://schemas.microsoft.com/office/drawing/2016/SVG/main" r:embed="rId4"/>
               </a:ext>
             </a:extLst>
           </a:blip>
@@ -11079,10 +11489,10 @@
           <p:nvPr/>
         </p:nvPicPr>
         <p:blipFill>
-          <a:blip r:embed="rId2">
+          <a:blip r:embed="rId3">
             <a:extLst>
               <a:ext uri="{96DAC541-7B7A-43D3-8B79-37D633B846F1}">
-                <asvg:svgBlip xmlns:asvg="http://schemas.microsoft.com/office/drawing/2016/SVG/main" r:embed="rId3"/>
+                <asvg:svgBlip xmlns:asvg="http://schemas.microsoft.com/office/drawing/2016/SVG/main" r:embed="rId4"/>
               </a:ext>
             </a:extLst>
           </a:blip>
@@ -11570,10 +11980,10 @@
           <p:nvPr/>
         </p:nvPicPr>
         <p:blipFill>
-          <a:blip r:embed="rId2">
+          <a:blip r:embed="rId3">
             <a:extLst>
               <a:ext uri="{96DAC541-7B7A-43D3-8B79-37D633B846F1}">
-                <asvg:svgBlip xmlns:asvg="http://schemas.microsoft.com/office/drawing/2016/SVG/main" r:embed="rId3"/>
+                <asvg:svgBlip xmlns:asvg="http://schemas.microsoft.com/office/drawing/2016/SVG/main" r:embed="rId4"/>
               </a:ext>
             </a:extLst>
           </a:blip>
@@ -11606,10 +12016,10 @@
           <p:nvPr/>
         </p:nvPicPr>
         <p:blipFill>
-          <a:blip r:embed="rId6">
+          <a:blip r:embed="rId7">
             <a:extLst>
               <a:ext uri="{96DAC541-7B7A-43D3-8B79-37D633B846F1}">
-                <asvg:svgBlip xmlns:asvg="http://schemas.microsoft.com/office/drawing/2016/SVG/main" r:embed="rId16"/>
+                <asvg:svgBlip xmlns:asvg="http://schemas.microsoft.com/office/drawing/2016/SVG/main" r:embed="rId17"/>
               </a:ext>
             </a:extLst>
           </a:blip>
@@ -11782,10 +12192,10 @@
           <p:nvPr/>
         </p:nvPicPr>
         <p:blipFill>
-          <a:blip r:embed="rId8">
+          <a:blip r:embed="rId9">
             <a:extLst>
               <a:ext uri="{96DAC541-7B7A-43D3-8B79-37D633B846F1}">
-                <asvg:svgBlip xmlns:asvg="http://schemas.microsoft.com/office/drawing/2016/SVG/main" r:embed="rId9"/>
+                <asvg:svgBlip xmlns:asvg="http://schemas.microsoft.com/office/drawing/2016/SVG/main" r:embed="rId10"/>
               </a:ext>
             </a:extLst>
           </a:blip>
@@ -11803,6 +12213,252 @@
           </a:prstGeom>
         </p:spPr>
       </p:pic>
+      <p:sp>
+        <p:nvSpPr>
+          <p:cNvPr id="2" name="TextBox 1">
+            <a:extLst>
+              <a:ext uri="{FF2B5EF4-FFF2-40B4-BE49-F238E27FC236}">
+                <a16:creationId xmlns:a16="http://schemas.microsoft.com/office/drawing/2014/main" id="{5AEB9628-46F5-24A4-9A7F-B66101883ED7}"/>
+              </a:ext>
+            </a:extLst>
+          </p:cNvPr>
+          <p:cNvSpPr txBox="1"/>
+          <p:nvPr/>
+        </p:nvSpPr>
+        <p:spPr>
+          <a:xfrm>
+            <a:off x="68908" y="394472"/>
+            <a:ext cx="286836" cy="369332"/>
+          </a:xfrm>
+          <a:prstGeom prst="rect">
+            <a:avLst/>
+          </a:prstGeom>
+          <a:noFill/>
+        </p:spPr>
+        <p:txBody>
+          <a:bodyPr wrap="square" rtlCol="0">
+            <a:spAutoFit/>
+          </a:bodyPr>
+          <a:lstStyle/>
+          <a:p>
+            <a:r>
+              <a:rPr lang="en-US" dirty="0"/>
+              <a:t>A</a:t>
+            </a:r>
+          </a:p>
+        </p:txBody>
+      </p:sp>
+      <p:sp>
+        <p:nvSpPr>
+          <p:cNvPr id="3" name="TextBox 2">
+            <a:extLst>
+              <a:ext uri="{FF2B5EF4-FFF2-40B4-BE49-F238E27FC236}">
+                <a16:creationId xmlns:a16="http://schemas.microsoft.com/office/drawing/2014/main" id="{9A754C09-D7AA-809D-F55E-0C4C393738D0}"/>
+              </a:ext>
+            </a:extLst>
+          </p:cNvPr>
+          <p:cNvSpPr txBox="1"/>
+          <p:nvPr/>
+        </p:nvSpPr>
+        <p:spPr>
+          <a:xfrm>
+            <a:off x="110078" y="2166544"/>
+            <a:ext cx="286836" cy="369332"/>
+          </a:xfrm>
+          <a:prstGeom prst="rect">
+            <a:avLst/>
+          </a:prstGeom>
+          <a:noFill/>
+        </p:spPr>
+        <p:txBody>
+          <a:bodyPr wrap="square" rtlCol="0">
+            <a:spAutoFit/>
+          </a:bodyPr>
+          <a:lstStyle/>
+          <a:p>
+            <a:r>
+              <a:rPr lang="en-US" dirty="0"/>
+              <a:t>B</a:t>
+            </a:r>
+          </a:p>
+        </p:txBody>
+      </p:sp>
+      <p:sp>
+        <p:nvSpPr>
+          <p:cNvPr id="13" name="TextBox 12">
+            <a:extLst>
+              <a:ext uri="{FF2B5EF4-FFF2-40B4-BE49-F238E27FC236}">
+                <a16:creationId xmlns:a16="http://schemas.microsoft.com/office/drawing/2014/main" id="{C839391D-FAF2-D078-E2D6-1B71F2B89CA4}"/>
+              </a:ext>
+            </a:extLst>
+          </p:cNvPr>
+          <p:cNvSpPr txBox="1"/>
+          <p:nvPr/>
+        </p:nvSpPr>
+        <p:spPr>
+          <a:xfrm>
+            <a:off x="44831" y="4198947"/>
+            <a:ext cx="286836" cy="369332"/>
+          </a:xfrm>
+          <a:prstGeom prst="rect">
+            <a:avLst/>
+          </a:prstGeom>
+          <a:noFill/>
+        </p:spPr>
+        <p:txBody>
+          <a:bodyPr wrap="square" rtlCol="0">
+            <a:spAutoFit/>
+          </a:bodyPr>
+          <a:lstStyle/>
+          <a:p>
+            <a:r>
+              <a:rPr lang="en-US" dirty="0"/>
+              <a:t>C</a:t>
+            </a:r>
+          </a:p>
+        </p:txBody>
+      </p:sp>
+      <p:sp>
+        <p:nvSpPr>
+          <p:cNvPr id="15" name="Rounded Rectangle 14">
+            <a:extLst>
+              <a:ext uri="{FF2B5EF4-FFF2-40B4-BE49-F238E27FC236}">
+                <a16:creationId xmlns:a16="http://schemas.microsoft.com/office/drawing/2014/main" id="{2154E059-E9E5-43C1-D89C-B590ECDBBD38}"/>
+              </a:ext>
+            </a:extLst>
+          </p:cNvPr>
+          <p:cNvSpPr/>
+          <p:nvPr/>
+        </p:nvSpPr>
+        <p:spPr>
+          <a:xfrm>
+            <a:off x="0" y="357235"/>
+            <a:ext cx="12192000" cy="1581822"/>
+          </a:xfrm>
+          <a:prstGeom prst="roundRect">
+            <a:avLst/>
+          </a:prstGeom>
+          <a:noFill/>
+        </p:spPr>
+        <p:style>
+          <a:lnRef idx="2">
+            <a:schemeClr val="accent1">
+              <a:shade val="15000"/>
+            </a:schemeClr>
+          </a:lnRef>
+          <a:fillRef idx="1">
+            <a:schemeClr val="accent1"/>
+          </a:fillRef>
+          <a:effectRef idx="0">
+            <a:schemeClr val="accent1"/>
+          </a:effectRef>
+          <a:fontRef idx="minor">
+            <a:schemeClr val="lt1"/>
+          </a:fontRef>
+        </p:style>
+        <p:txBody>
+          <a:bodyPr rtlCol="0" anchor="ctr"/>
+          <a:lstStyle/>
+          <a:p>
+            <a:pPr algn="ctr"/>
+            <a:endParaRPr lang="en-US"/>
+          </a:p>
+        </p:txBody>
+      </p:sp>
+      <p:sp>
+        <p:nvSpPr>
+          <p:cNvPr id="16" name="Rounded Rectangle 15">
+            <a:extLst>
+              <a:ext uri="{FF2B5EF4-FFF2-40B4-BE49-F238E27FC236}">
+                <a16:creationId xmlns:a16="http://schemas.microsoft.com/office/drawing/2014/main" id="{9D2E43A9-EAFB-C9E1-751D-588FC1A67D38}"/>
+              </a:ext>
+            </a:extLst>
+          </p:cNvPr>
+          <p:cNvSpPr/>
+          <p:nvPr/>
+        </p:nvSpPr>
+        <p:spPr>
+          <a:xfrm>
+            <a:off x="26456" y="2054433"/>
+            <a:ext cx="12192000" cy="2019845"/>
+          </a:xfrm>
+          <a:prstGeom prst="roundRect">
+            <a:avLst/>
+          </a:prstGeom>
+          <a:noFill/>
+        </p:spPr>
+        <p:style>
+          <a:lnRef idx="2">
+            <a:schemeClr val="accent1">
+              <a:shade val="15000"/>
+            </a:schemeClr>
+          </a:lnRef>
+          <a:fillRef idx="1">
+            <a:schemeClr val="accent1"/>
+          </a:fillRef>
+          <a:effectRef idx="0">
+            <a:schemeClr val="accent1"/>
+          </a:effectRef>
+          <a:fontRef idx="minor">
+            <a:schemeClr val="lt1"/>
+          </a:fontRef>
+        </p:style>
+        <p:txBody>
+          <a:bodyPr rtlCol="0" anchor="ctr"/>
+          <a:lstStyle/>
+          <a:p>
+            <a:pPr algn="ctr"/>
+            <a:endParaRPr lang="en-US"/>
+          </a:p>
+        </p:txBody>
+      </p:sp>
+      <p:sp>
+        <p:nvSpPr>
+          <p:cNvPr id="17" name="Rounded Rectangle 16">
+            <a:extLst>
+              <a:ext uri="{FF2B5EF4-FFF2-40B4-BE49-F238E27FC236}">
+                <a16:creationId xmlns:a16="http://schemas.microsoft.com/office/drawing/2014/main" id="{B1FE9234-EAE4-BC34-BD3C-29FDC2C64A79}"/>
+              </a:ext>
+            </a:extLst>
+          </p:cNvPr>
+          <p:cNvSpPr/>
+          <p:nvPr/>
+        </p:nvSpPr>
+        <p:spPr>
+          <a:xfrm>
+            <a:off x="-49828" y="4126078"/>
+            <a:ext cx="12192000" cy="2731921"/>
+          </a:xfrm>
+          <a:prstGeom prst="roundRect">
+            <a:avLst/>
+          </a:prstGeom>
+          <a:noFill/>
+        </p:spPr>
+        <p:style>
+          <a:lnRef idx="2">
+            <a:schemeClr val="accent1">
+              <a:shade val="15000"/>
+            </a:schemeClr>
+          </a:lnRef>
+          <a:fillRef idx="1">
+            <a:schemeClr val="accent1"/>
+          </a:fillRef>
+          <a:effectRef idx="0">
+            <a:schemeClr val="accent1"/>
+          </a:effectRef>
+          <a:fontRef idx="minor">
+            <a:schemeClr val="lt1"/>
+          </a:fontRef>
+        </p:style>
+        <p:txBody>
+          <a:bodyPr rtlCol="0" anchor="ctr"/>
+          <a:lstStyle/>
+          <a:p>
+            <a:pPr algn="ctr"/>
+            <a:endParaRPr lang="en-US"/>
+          </a:p>
+        </p:txBody>
+      </p:sp>
     </p:spTree>
     <p:extLst>
       <p:ext uri="{BB962C8B-B14F-4D97-AF65-F5344CB8AC3E}">
@@ -12129,4 +12785,319 @@
     </a:ext>
   </a:extLst>
 </a:theme>
+</file>
+
+<file path=ppt/theme/theme2.xml><?xml version="1.0" encoding="utf-8"?>
+<a:theme xmlns:a="http://schemas.openxmlformats.org/drawingml/2006/main" name="Office Theme">
+  <a:themeElements>
+    <a:clrScheme name="Office">
+      <a:dk1>
+        <a:sysClr val="windowText" lastClr="000000"/>
+      </a:dk1>
+      <a:lt1>
+        <a:sysClr val="window" lastClr="FFFFFF"/>
+      </a:lt1>
+      <a:dk2>
+        <a:srgbClr val="0E2841"/>
+      </a:dk2>
+      <a:lt2>
+        <a:srgbClr val="E8E8E8"/>
+      </a:lt2>
+      <a:accent1>
+        <a:srgbClr val="156082"/>
+      </a:accent1>
+      <a:accent2>
+        <a:srgbClr val="E97132"/>
+      </a:accent2>
+      <a:accent3>
+        <a:srgbClr val="196B24"/>
+      </a:accent3>
+      <a:accent4>
+        <a:srgbClr val="0F9ED5"/>
+      </a:accent4>
+      <a:accent5>
+        <a:srgbClr val="A02B93"/>
+      </a:accent5>
+      <a:accent6>
+        <a:srgbClr val="4EA72E"/>
+      </a:accent6>
+      <a:hlink>
+        <a:srgbClr val="467886"/>
+      </a:hlink>
+      <a:folHlink>
+        <a:srgbClr val="96607D"/>
+      </a:folHlink>
+    </a:clrScheme>
+    <a:fontScheme name="Office">
+      <a:majorFont>
+        <a:latin typeface="Aptos Display" panose="02110004020202020204"/>
+        <a:ea typeface=""/>
+        <a:cs typeface=""/>
+        <a:font script="Jpan" typeface="游ゴシック Light"/>
+        <a:font script="Hang" typeface="맑은 고딕"/>
+        <a:font script="Hans" typeface="等线 Light"/>
+        <a:font script="Hant" typeface="新細明體"/>
+        <a:font script="Arab" typeface="Times New Roman"/>
+        <a:font script="Hebr" typeface="Times New Roman"/>
+        <a:font script="Thai" typeface="Angsana New"/>
+        <a:font script="Ethi" typeface="Nyala"/>
+        <a:font script="Beng" typeface="Vrinda"/>
+        <a:font script="Gujr" typeface="Shruti"/>
+        <a:font script="Khmr" typeface="MoolBoran"/>
+        <a:font script="Knda" typeface="Tunga"/>
+        <a:font script="Guru" typeface="Raavi"/>
+        <a:font script="Cans" typeface="Euphemia"/>
+        <a:font script="Cher" typeface="Plantagenet Cherokee"/>
+        <a:font script="Yiii" typeface="Microsoft Yi Baiti"/>
+        <a:font script="Tibt" typeface="Microsoft Himalaya"/>
+        <a:font script="Thaa" typeface="MV Boli"/>
+        <a:font script="Deva" typeface="Mangal"/>
+        <a:font script="Telu" typeface="Gautami"/>
+        <a:font script="Taml" typeface="Latha"/>
+        <a:font script="Syrc" typeface="Estrangelo Edessa"/>
+        <a:font script="Orya" typeface="Kalinga"/>
+        <a:font script="Mlym" typeface="Kartika"/>
+        <a:font script="Laoo" typeface="DokChampa"/>
+        <a:font script="Sinh" typeface="Iskoola Pota"/>
+        <a:font script="Mong" typeface="Mongolian Baiti"/>
+        <a:font script="Viet" typeface="Times New Roman"/>
+        <a:font script="Uigh" typeface="Microsoft Uighur"/>
+        <a:font script="Geor" typeface="Sylfaen"/>
+        <a:font script="Armn" typeface="Arial"/>
+        <a:font script="Bugi" typeface="Leelawadee UI"/>
+        <a:font script="Bopo" typeface="Microsoft JhengHei"/>
+        <a:font script="Java" typeface="Javanese Text"/>
+        <a:font script="Lisu" typeface="Segoe UI"/>
+        <a:font script="Mymr" typeface="Myanmar Text"/>
+        <a:font script="Nkoo" typeface="Ebrima"/>
+        <a:font script="Olck" typeface="Nirmala UI"/>
+        <a:font script="Osma" typeface="Ebrima"/>
+        <a:font script="Phag" typeface="Phagspa"/>
+        <a:font script="Syrn" typeface="Estrangelo Edessa"/>
+        <a:font script="Syrj" typeface="Estrangelo Edessa"/>
+        <a:font script="Syre" typeface="Estrangelo Edessa"/>
+        <a:font script="Sora" typeface="Nirmala UI"/>
+        <a:font script="Tale" typeface="Microsoft Tai Le"/>
+        <a:font script="Talu" typeface="Microsoft New Tai Lue"/>
+        <a:font script="Tfng" typeface="Ebrima"/>
+      </a:majorFont>
+      <a:minorFont>
+        <a:latin typeface="Aptos" panose="02110004020202020204"/>
+        <a:ea typeface=""/>
+        <a:cs typeface=""/>
+        <a:font script="Jpan" typeface="游ゴシック"/>
+        <a:font script="Hang" typeface="맑은 고딕"/>
+        <a:font script="Hans" typeface="等线"/>
+        <a:font script="Hant" typeface="新細明體"/>
+        <a:font script="Arab" typeface="Arial"/>
+        <a:font script="Hebr" typeface="Arial"/>
+        <a:font script="Thai" typeface="Cordia New"/>
+        <a:font script="Ethi" typeface="Nyala"/>
+        <a:font script="Beng" typeface="Vrinda"/>
+        <a:font script="Gujr" typeface="Shruti"/>
+        <a:font script="Khmr" typeface="DaunPenh"/>
+        <a:font script="Knda" typeface="Tunga"/>
+        <a:font script="Guru" typeface="Raavi"/>
+        <a:font script="Cans" typeface="Euphemia"/>
+        <a:font script="Cher" typeface="Plantagenet Cherokee"/>
+        <a:font script="Yiii" typeface="Microsoft Yi Baiti"/>
+        <a:font script="Tibt" typeface="Microsoft Himalaya"/>
+        <a:font script="Thaa" typeface="MV Boli"/>
+        <a:font script="Deva" typeface="Mangal"/>
+        <a:font script="Telu" typeface="Gautami"/>
+        <a:font script="Taml" typeface="Latha"/>
+        <a:font script="Syrc" typeface="Estrangelo Edessa"/>
+        <a:font script="Orya" typeface="Kalinga"/>
+        <a:font script="Mlym" typeface="Kartika"/>
+        <a:font script="Laoo" typeface="DokChampa"/>
+        <a:font script="Sinh" typeface="Iskoola Pota"/>
+        <a:font script="Mong" typeface="Mongolian Baiti"/>
+        <a:font script="Viet" typeface="Arial"/>
+        <a:font script="Uigh" typeface="Microsoft Uighur"/>
+        <a:font script="Geor" typeface="Sylfaen"/>
+        <a:font script="Armn" typeface="Arial"/>
+        <a:font script="Bugi" typeface="Leelawadee UI"/>
+        <a:font script="Bopo" typeface="Microsoft JhengHei"/>
+        <a:font script="Java" typeface="Javanese Text"/>
+        <a:font script="Lisu" typeface="Segoe UI"/>
+        <a:font script="Mymr" typeface="Myanmar Text"/>
+        <a:font script="Nkoo" typeface="Ebrima"/>
+        <a:font script="Olck" typeface="Nirmala UI"/>
+        <a:font script="Osma" typeface="Ebrima"/>
+        <a:font script="Phag" typeface="Phagspa"/>
+        <a:font script="Syrn" typeface="Estrangelo Edessa"/>
+        <a:font script="Syrj" typeface="Estrangelo Edessa"/>
+        <a:font script="Syre" typeface="Estrangelo Edessa"/>
+        <a:font script="Sora" typeface="Nirmala UI"/>
+        <a:font script="Tale" typeface="Microsoft Tai Le"/>
+        <a:font script="Talu" typeface="Microsoft New Tai Lue"/>
+        <a:font script="Tfng" typeface="Ebrima"/>
+      </a:minorFont>
+    </a:fontScheme>
+    <a:fmtScheme name="Office">
+      <a:fillStyleLst>
+        <a:solidFill>
+          <a:schemeClr val="phClr"/>
+        </a:solidFill>
+        <a:gradFill rotWithShape="1">
+          <a:gsLst>
+            <a:gs pos="0">
+              <a:schemeClr val="phClr">
+                <a:lumMod val="110000"/>
+                <a:satMod val="105000"/>
+                <a:tint val="67000"/>
+              </a:schemeClr>
+            </a:gs>
+            <a:gs pos="50000">
+              <a:schemeClr val="phClr">
+                <a:lumMod val="105000"/>
+                <a:satMod val="103000"/>
+                <a:tint val="73000"/>
+              </a:schemeClr>
+            </a:gs>
+            <a:gs pos="100000">
+              <a:schemeClr val="phClr">
+                <a:lumMod val="105000"/>
+                <a:satMod val="109000"/>
+                <a:tint val="81000"/>
+              </a:schemeClr>
+            </a:gs>
+          </a:gsLst>
+          <a:lin ang="5400000" scaled="0"/>
+        </a:gradFill>
+        <a:gradFill rotWithShape="1">
+          <a:gsLst>
+            <a:gs pos="0">
+              <a:schemeClr val="phClr">
+                <a:satMod val="103000"/>
+                <a:lumMod val="102000"/>
+                <a:tint val="94000"/>
+              </a:schemeClr>
+            </a:gs>
+            <a:gs pos="50000">
+              <a:schemeClr val="phClr">
+                <a:satMod val="110000"/>
+                <a:lumMod val="100000"/>
+                <a:shade val="100000"/>
+              </a:schemeClr>
+            </a:gs>
+            <a:gs pos="100000">
+              <a:schemeClr val="phClr">
+                <a:lumMod val="99000"/>
+                <a:satMod val="120000"/>
+                <a:shade val="78000"/>
+              </a:schemeClr>
+            </a:gs>
+          </a:gsLst>
+          <a:lin ang="5400000" scaled="0"/>
+        </a:gradFill>
+      </a:fillStyleLst>
+      <a:lnStyleLst>
+        <a:ln w="12700" cap="flat" cmpd="sng" algn="ctr">
+          <a:solidFill>
+            <a:schemeClr val="phClr"/>
+          </a:solidFill>
+          <a:prstDash val="solid"/>
+          <a:miter lim="800000"/>
+        </a:ln>
+        <a:ln w="19050" cap="flat" cmpd="sng" algn="ctr">
+          <a:solidFill>
+            <a:schemeClr val="phClr"/>
+          </a:solidFill>
+          <a:prstDash val="solid"/>
+          <a:miter lim="800000"/>
+        </a:ln>
+        <a:ln w="25400" cap="flat" cmpd="sng" algn="ctr">
+          <a:solidFill>
+            <a:schemeClr val="phClr"/>
+          </a:solidFill>
+          <a:prstDash val="solid"/>
+          <a:miter lim="800000"/>
+        </a:ln>
+      </a:lnStyleLst>
+      <a:effectStyleLst>
+        <a:effectStyle>
+          <a:effectLst/>
+        </a:effectStyle>
+        <a:effectStyle>
+          <a:effectLst/>
+        </a:effectStyle>
+        <a:effectStyle>
+          <a:effectLst>
+            <a:outerShdw blurRad="57150" dist="19050" dir="5400000" algn="ctr" rotWithShape="0">
+              <a:srgbClr val="000000">
+                <a:alpha val="63000"/>
+              </a:srgbClr>
+            </a:outerShdw>
+          </a:effectLst>
+        </a:effectStyle>
+      </a:effectStyleLst>
+      <a:bgFillStyleLst>
+        <a:solidFill>
+          <a:schemeClr val="phClr"/>
+        </a:solidFill>
+        <a:solidFill>
+          <a:schemeClr val="phClr">
+            <a:tint val="95000"/>
+            <a:satMod val="170000"/>
+          </a:schemeClr>
+        </a:solidFill>
+        <a:gradFill rotWithShape="1">
+          <a:gsLst>
+            <a:gs pos="0">
+              <a:schemeClr val="phClr">
+                <a:tint val="93000"/>
+                <a:satMod val="150000"/>
+                <a:shade val="98000"/>
+                <a:lumMod val="102000"/>
+              </a:schemeClr>
+            </a:gs>
+            <a:gs pos="50000">
+              <a:schemeClr val="phClr">
+                <a:tint val="98000"/>
+                <a:satMod val="130000"/>
+                <a:shade val="90000"/>
+                <a:lumMod val="103000"/>
+              </a:schemeClr>
+            </a:gs>
+            <a:gs pos="100000">
+              <a:schemeClr val="phClr">
+                <a:shade val="63000"/>
+                <a:satMod val="120000"/>
+              </a:schemeClr>
+            </a:gs>
+          </a:gsLst>
+          <a:lin ang="5400000" scaled="0"/>
+        </a:gradFill>
+      </a:bgFillStyleLst>
+    </a:fmtScheme>
+  </a:themeElements>
+  <a:objectDefaults>
+    <a:lnDef>
+      <a:spPr/>
+      <a:bodyPr/>
+      <a:lstStyle/>
+      <a:style>
+        <a:lnRef idx="2">
+          <a:schemeClr val="accent1"/>
+        </a:lnRef>
+        <a:fillRef idx="0">
+          <a:schemeClr val="accent1"/>
+        </a:fillRef>
+        <a:effectRef idx="1">
+          <a:schemeClr val="accent1"/>
+        </a:effectRef>
+        <a:fontRef idx="minor">
+          <a:schemeClr val="tx1"/>
+        </a:fontRef>
+      </a:style>
+    </a:lnDef>
+  </a:objectDefaults>
+  <a:extraClrSchemeLst/>
+  <a:extLst>
+    <a:ext uri="{05A4C25C-085E-4340-85A3-A5531E510DB2}">
+      <thm15:themeFamily xmlns:thm15="http://schemas.microsoft.com/office/thememl/2012/main" name="Office Theme" id="{2E142A2C-CD16-42D6-873A-C26D2A0506FA}" vid="{1BDDFF52-6CD6-40A5-AB3C-68EB2F1E4D0A}"/>
+    </a:ext>
+  </a:extLst>
+</a:theme>
 </file>
</xml_diff>